<commit_message>
small changes to readme and ppt
</commit_message>
<xml_diff>
--- a/STAG - Screenplay demo.pptx
+++ b/STAG - Screenplay demo.pptx
@@ -10,9 +10,9 @@
     <p:sldId id="259" r:id="rId4"/>
     <p:sldId id="260" r:id="rId5"/>
     <p:sldId id="263" r:id="rId6"/>
-    <p:sldId id="275" r:id="rId7"/>
-    <p:sldId id="276" r:id="rId8"/>
-    <p:sldId id="277" r:id="rId9"/>
+    <p:sldId id="276" r:id="rId7"/>
+    <p:sldId id="277" r:id="rId8"/>
+    <p:sldId id="275" r:id="rId9"/>
     <p:sldId id="278" r:id="rId10"/>
     <p:sldId id="279" r:id="rId11"/>
     <p:sldId id="280" r:id="rId12"/>
@@ -278,7 +278,7 @@
           <a:p>
             <a:fld id="{8E08265D-5CB6-4023-BD7E-98E739032D44}" type="datetimeFigureOut">
               <a:rPr lang="en-US" smtClean="0"/>
-              <a:t>7/19/2017</a:t>
+              <a:t>7/20/17</a:t>
             </a:fld>
             <a:endParaRPr lang="en-US"/>
           </a:p>
@@ -446,7 +446,7 @@
           <a:p>
             <a:fld id="{8E08265D-5CB6-4023-BD7E-98E739032D44}" type="datetimeFigureOut">
               <a:rPr lang="en-US" smtClean="0"/>
-              <a:t>7/19/2017</a:t>
+              <a:t>7/20/17</a:t>
             </a:fld>
             <a:endParaRPr lang="en-US"/>
           </a:p>
@@ -624,7 +624,7 @@
           <a:p>
             <a:fld id="{8E08265D-5CB6-4023-BD7E-98E739032D44}" type="datetimeFigureOut">
               <a:rPr lang="en-US" smtClean="0"/>
-              <a:t>7/19/2017</a:t>
+              <a:t>7/20/17</a:t>
             </a:fld>
             <a:endParaRPr lang="en-US"/>
           </a:p>
@@ -792,7 +792,7 @@
           <a:p>
             <a:fld id="{8E08265D-5CB6-4023-BD7E-98E739032D44}" type="datetimeFigureOut">
               <a:rPr lang="en-US" smtClean="0"/>
-              <a:t>7/19/2017</a:t>
+              <a:t>7/20/17</a:t>
             </a:fld>
             <a:endParaRPr lang="en-US"/>
           </a:p>
@@ -1037,7 +1037,7 @@
           <a:p>
             <a:fld id="{8E08265D-5CB6-4023-BD7E-98E739032D44}" type="datetimeFigureOut">
               <a:rPr lang="en-US" smtClean="0"/>
-              <a:t>7/19/2017</a:t>
+              <a:t>7/20/17</a:t>
             </a:fld>
             <a:endParaRPr lang="en-US"/>
           </a:p>
@@ -1266,7 +1266,7 @@
           <a:p>
             <a:fld id="{8E08265D-5CB6-4023-BD7E-98E739032D44}" type="datetimeFigureOut">
               <a:rPr lang="en-US" smtClean="0"/>
-              <a:t>7/19/2017</a:t>
+              <a:t>7/20/17</a:t>
             </a:fld>
             <a:endParaRPr lang="en-US"/>
           </a:p>
@@ -1630,7 +1630,7 @@
           <a:p>
             <a:fld id="{8E08265D-5CB6-4023-BD7E-98E739032D44}" type="datetimeFigureOut">
               <a:rPr lang="en-US" smtClean="0"/>
-              <a:t>7/19/2017</a:t>
+              <a:t>7/20/17</a:t>
             </a:fld>
             <a:endParaRPr lang="en-US"/>
           </a:p>
@@ -1747,7 +1747,7 @@
           <a:p>
             <a:fld id="{8E08265D-5CB6-4023-BD7E-98E739032D44}" type="datetimeFigureOut">
               <a:rPr lang="en-US" smtClean="0"/>
-              <a:t>7/19/2017</a:t>
+              <a:t>7/20/17</a:t>
             </a:fld>
             <a:endParaRPr lang="en-US"/>
           </a:p>
@@ -1842,7 +1842,7 @@
           <a:p>
             <a:fld id="{8E08265D-5CB6-4023-BD7E-98E739032D44}" type="datetimeFigureOut">
               <a:rPr lang="en-US" smtClean="0"/>
-              <a:t>7/19/2017</a:t>
+              <a:t>7/20/17</a:t>
             </a:fld>
             <a:endParaRPr lang="en-US"/>
           </a:p>
@@ -2117,7 +2117,7 @@
           <a:p>
             <a:fld id="{8E08265D-5CB6-4023-BD7E-98E739032D44}" type="datetimeFigureOut">
               <a:rPr lang="en-US" smtClean="0"/>
-              <a:t>7/19/2017</a:t>
+              <a:t>7/20/17</a:t>
             </a:fld>
             <a:endParaRPr lang="en-US"/>
           </a:p>
@@ -2369,7 +2369,7 @@
           <a:p>
             <a:fld id="{8E08265D-5CB6-4023-BD7E-98E739032D44}" type="datetimeFigureOut">
               <a:rPr lang="en-US" smtClean="0"/>
-              <a:t>7/19/2017</a:t>
+              <a:t>7/20/17</a:t>
             </a:fld>
             <a:endParaRPr lang="en-US"/>
           </a:p>
@@ -2580,7 +2580,7 @@
           <a:p>
             <a:fld id="{8E08265D-5CB6-4023-BD7E-98E739032D44}" type="datetimeFigureOut">
               <a:rPr lang="en-US" smtClean="0"/>
-              <a:t>7/19/2017</a:t>
+              <a:t>7/20/17</a:t>
             </a:fld>
             <a:endParaRPr lang="en-US"/>
           </a:p>
@@ -3018,7 +3018,15 @@
           <a:p>
             <a:r>
               <a:rPr lang="en-AU" b="1" dirty="0"/>
-              <a:t>Software Test Automation Group (STAG) </a:t>
+              <a:t>Software Test Automation </a:t>
+            </a:r>
+            <a:r>
+              <a:rPr lang="en-AU" b="1" dirty="0" smtClean="0"/>
+              <a:t> Group </a:t>
+            </a:r>
+            <a:r>
+              <a:rPr lang="en-AU" b="1" dirty="0"/>
+              <a:t>(STAG) </a:t>
             </a:r>
             <a:endParaRPr lang="en-US" b="1" dirty="0"/>
           </a:p>
@@ -3076,7 +3084,7 @@
         </p:blipFill>
         <p:spPr>
           <a:xfrm>
-            <a:off x="0" y="0"/>
+            <a:off x="0" y="-46037"/>
             <a:ext cx="12192000" cy="1905000"/>
           </a:xfrm>
           <a:prstGeom prst="rect">
@@ -3288,6 +3296,13 @@
   <p:clrMapOvr>
     <a:masterClrMapping/>
   </p:clrMapOvr>
+  <p:timing>
+    <p:tnLst>
+      <p:par>
+        <p:cTn id="1" dur="indefinite" restart="never" nodeType="tmRoot"/>
+      </p:par>
+    </p:tnLst>
+  </p:timing>
 </p:sld>
 </file>
 
@@ -3347,7 +3362,7 @@
           <p:cNvPr id="2050" name="Picture 2" descr="https://d262ilb51hltx0.cloudfront.net/max/800/0*u8MCnsbNJZeV36Ju.">
             <a:extLst>
               <a:ext uri="{FF2B5EF4-FFF2-40B4-BE49-F238E27FC236}">
-                <a16:creationId xmlns:a16="http://schemas.microsoft.com/office/drawing/2014/main" id="{E3C785B2-2A7F-4CDA-9B7B-B29639D31974}"/>
+                <a16:creationId xmlns:a16="http://schemas.microsoft.com/office/drawing/2014/main" xmlns="" id="{E3C785B2-2A7F-4CDA-9B7B-B29639D31974}"/>
               </a:ext>
             </a:extLst>
           </p:cNvPr>
@@ -3394,7 +3409,7 @@
           <p:cNvPr id="2052" name="Picture 4" descr="https://d262ilb51hltx0.cloudfront.net/max/800/0*0er2D74ujAMYzt0Q.">
             <a:extLst>
               <a:ext uri="{FF2B5EF4-FFF2-40B4-BE49-F238E27FC236}">
-                <a16:creationId xmlns:a16="http://schemas.microsoft.com/office/drawing/2014/main" id="{3BD2C94E-C6FC-4606-89DF-713E99EF8FDD}"/>
+                <a16:creationId xmlns:a16="http://schemas.microsoft.com/office/drawing/2014/main" xmlns="" id="{3BD2C94E-C6FC-4606-89DF-713E99EF8FDD}"/>
               </a:ext>
             </a:extLst>
           </p:cNvPr>
@@ -3436,6 +3451,46 @@
           </a:extLst>
         </p:spPr>
       </p:pic>
+      <p:sp>
+        <p:nvSpPr>
+          <p:cNvPr id="3" name="TextBox 2"/>
+          <p:cNvSpPr txBox="1"/>
+          <p:nvPr/>
+        </p:nvSpPr>
+        <p:spPr>
+          <a:xfrm>
+            <a:off x="6662636" y="5722372"/>
+            <a:ext cx="4905014" cy="369332"/>
+          </a:xfrm>
+          <a:prstGeom prst="rect">
+            <a:avLst/>
+          </a:prstGeom>
+          <a:noFill/>
+        </p:spPr>
+        <p:txBody>
+          <a:bodyPr wrap="square" rtlCol="0">
+            <a:spAutoFit/>
+          </a:bodyPr>
+          <a:lstStyle/>
+          <a:p>
+            <a:pPr marL="0" lvl="1"/>
+            <a:r>
+              <a:rPr lang="en-US" sz="900" dirty="0" smtClean="0"/>
+              <a:t>Images taken from: </a:t>
+            </a:r>
+            <a:r>
+              <a:rPr lang="en-AU" sz="900" dirty="0">
+                <a:hlinkClick r:id="rId4"/>
+              </a:rPr>
+              <a:t>https://dzone.com/articles/page-objects-refactored-solid-steps-to-the-screenp</a:t>
+            </a:r>
+            <a:endParaRPr lang="en-AU" sz="900" dirty="0"/>
+          </a:p>
+          <a:p>
+            <a:endParaRPr lang="en-US" sz="900" dirty="0"/>
+          </a:p>
+        </p:txBody>
+      </p:sp>
     </p:spTree>
     <p:extLst>
       <p:ext uri="{BB962C8B-B14F-4D97-AF65-F5344CB8AC3E}">
@@ -3446,6 +3501,13 @@
   <p:clrMapOvr>
     <a:masterClrMapping/>
   </p:clrMapOvr>
+  <p:timing>
+    <p:tnLst>
+      <p:par>
+        <p:cTn id="1" dur="indefinite" restart="never" nodeType="tmRoot"/>
+      </p:par>
+    </p:tnLst>
+  </p:timing>
 </p:sld>
 </file>
 
@@ -3494,7 +3556,11 @@
           <a:p>
             <a:r>
               <a:rPr lang="en-AU" dirty="0"/>
-              <a:t>Breaking down page objects incorrectly</a:t>
+              <a:t>Breaking down page objects </a:t>
+            </a:r>
+            <a:r>
+              <a:rPr lang="en-AU" dirty="0" smtClean="0"/>
+              <a:t>incorrectly</a:t>
             </a:r>
             <a:endParaRPr lang="en-US" dirty="0"/>
           </a:p>
@@ -3505,7 +3571,7 @@
           <p:cNvPr id="7" name="Content Placeholder 2">
             <a:extLst>
               <a:ext uri="{FF2B5EF4-FFF2-40B4-BE49-F238E27FC236}">
-                <a16:creationId xmlns:a16="http://schemas.microsoft.com/office/drawing/2014/main" id="{4AE5F24B-F5BB-4ADA-A872-75DD35F750C2}"/>
+                <a16:creationId xmlns:a16="http://schemas.microsoft.com/office/drawing/2014/main" xmlns="" id="{4AE5F24B-F5BB-4ADA-A872-75DD35F750C2}"/>
               </a:ext>
             </a:extLst>
           </p:cNvPr>
@@ -3532,8 +3598,12 @@
               <a:buNone/>
             </a:pPr>
             <a:r>
-              <a:rPr lang="en-AU" dirty="0"/>
-              <a:t>[X] OCP [ ] SRP</a:t>
+              <a:rPr lang="en-AU" dirty="0" smtClean="0"/>
+              <a:t>[X</a:t>
+            </a:r>
+            <a:r>
+              <a:rPr lang="en-AU" dirty="0"/>
+              <a:t>] OCP [ ] SRP</a:t>
             </a:r>
           </a:p>
           <a:p>
@@ -3549,7 +3619,7 @@
           <p:cNvPr id="8" name="Content Placeholder 2">
             <a:extLst>
               <a:ext uri="{FF2B5EF4-FFF2-40B4-BE49-F238E27FC236}">
-                <a16:creationId xmlns:a16="http://schemas.microsoft.com/office/drawing/2014/main" id="{B715F95F-563A-4D32-82C4-DA356A4C52AC}"/>
+                <a16:creationId xmlns:a16="http://schemas.microsoft.com/office/drawing/2014/main" xmlns="" id="{B715F95F-563A-4D32-82C4-DA356A4C52AC}"/>
               </a:ext>
             </a:extLst>
           </p:cNvPr>
@@ -3741,8 +3811,12 @@
               <a:buNone/>
             </a:pPr>
             <a:r>
-              <a:rPr lang="en-AU" dirty="0"/>
-              <a:t>[ ] OCP [X] SRP</a:t>
+              <a:rPr lang="en-AU" dirty="0" smtClean="0"/>
+              <a:t>[ </a:t>
+            </a:r>
+            <a:r>
+              <a:rPr lang="en-AU" dirty="0"/>
+              <a:t>] OCP [X] SRP</a:t>
             </a:r>
           </a:p>
         </p:txBody>
@@ -3752,7 +3826,7 @@
           <p:cNvPr id="3078" name="Picture 6" descr="https://d262ilb51hltx0.cloudfront.net/max/800/0*Jsz7SfUSzksWY1F5.">
             <a:extLst>
               <a:ext uri="{FF2B5EF4-FFF2-40B4-BE49-F238E27FC236}">
-                <a16:creationId xmlns:a16="http://schemas.microsoft.com/office/drawing/2014/main" id="{25336F61-E9DC-4D14-8BCE-232E4E5083B6}"/>
+                <a16:creationId xmlns:a16="http://schemas.microsoft.com/office/drawing/2014/main" xmlns="" id="{25336F61-E9DC-4D14-8BCE-232E4E5083B6}"/>
               </a:ext>
             </a:extLst>
           </p:cNvPr>
@@ -3799,7 +3873,7 @@
           <p:cNvPr id="3080" name="Picture 8" descr="https://d262ilb51hltx0.cloudfront.net/max/800/0*t4i0_t86lPSGMEK9.">
             <a:extLst>
               <a:ext uri="{FF2B5EF4-FFF2-40B4-BE49-F238E27FC236}">
-                <a16:creationId xmlns:a16="http://schemas.microsoft.com/office/drawing/2014/main" id="{D90BE803-4075-4687-8F25-E32378C4ECC9}"/>
+                <a16:creationId xmlns:a16="http://schemas.microsoft.com/office/drawing/2014/main" xmlns="" id="{D90BE803-4075-4687-8F25-E32378C4ECC9}"/>
               </a:ext>
             </a:extLst>
           </p:cNvPr>
@@ -3823,7 +3897,7 @@
         </p:blipFill>
         <p:spPr bwMode="auto">
           <a:xfrm>
-            <a:off x="593986" y="1665108"/>
+            <a:off x="616288" y="1665108"/>
             <a:ext cx="5367920" cy="4152400"/>
           </a:xfrm>
           <a:prstGeom prst="rect">
@@ -3846,7 +3920,7 @@
           <p:cNvPr id="11" name="Content Placeholder 2">
             <a:extLst>
               <a:ext uri="{FF2B5EF4-FFF2-40B4-BE49-F238E27FC236}">
-                <a16:creationId xmlns:a16="http://schemas.microsoft.com/office/drawing/2014/main" id="{45B27745-25B0-4661-9204-36F5C287F7D6}"/>
+                <a16:creationId xmlns:a16="http://schemas.microsoft.com/office/drawing/2014/main" xmlns="" id="{45B27745-25B0-4661-9204-36F5C287F7D6}"/>
               </a:ext>
             </a:extLst>
           </p:cNvPr>
@@ -3857,8 +3931,8 @@
         </p:nvSpPr>
         <p:spPr>
           <a:xfrm>
-            <a:off x="3823636" y="3421625"/>
-            <a:ext cx="1795499" cy="342437"/>
+            <a:off x="3456878" y="3421625"/>
+            <a:ext cx="2162257" cy="385703"/>
           </a:xfrm>
           <a:prstGeom prst="rect">
             <a:avLst/>
@@ -3866,7 +3940,7 @@
         </p:spPr>
         <p:txBody>
           <a:bodyPr vert="horz" lIns="91440" tIns="45720" rIns="91440" bIns="45720" rtlCol="0">
-            <a:normAutofit fontScale="40000" lnSpcReduction="20000"/>
+            <a:normAutofit fontScale="47500" lnSpcReduction="20000"/>
           </a:bodyPr>
           <a:lstStyle>
             <a:lvl1pPr marL="228600" indent="-228600" algn="l" defTabSz="914400" rtl="0" eaLnBrk="1" latinLnBrk="0" hangingPunct="1">
@@ -4039,14 +4113,12 @@
             </a:pPr>
             <a:r>
               <a:rPr lang="en-AU" i="1" dirty="0"/>
-              <a:t>What if they share the same Web Element?</a:t>
-            </a:r>
-          </a:p>
-          <a:p>
-            <a:pPr marL="0" indent="0">
-              <a:buFont typeface="Arial" panose="020B0604020202020204" pitchFamily="34" charset="0"/>
-              <a:buNone/>
-            </a:pPr>
+              <a:t>What if they share the same Web Element</a:t>
+            </a:r>
+            <a:r>
+              <a:rPr lang="en-AU" i="1" dirty="0" smtClean="0"/>
+              <a:t>? </a:t>
+            </a:r>
             <a:endParaRPr lang="en-AU" dirty="0"/>
           </a:p>
         </p:txBody>
@@ -4056,7 +4128,7 @@
           <p:cNvPr id="12" name="Content Placeholder 2">
             <a:extLst>
               <a:ext uri="{FF2B5EF4-FFF2-40B4-BE49-F238E27FC236}">
-                <a16:creationId xmlns:a16="http://schemas.microsoft.com/office/drawing/2014/main" id="{100EF715-C7B8-4CD6-99CC-DE8B6F9BB14C}"/>
+                <a16:creationId xmlns:a16="http://schemas.microsoft.com/office/drawing/2014/main" xmlns="" id="{100EF715-C7B8-4CD6-99CC-DE8B6F9BB14C}"/>
               </a:ext>
             </a:extLst>
           </p:cNvPr>
@@ -4249,14 +4321,467 @@
             </a:pPr>
             <a:r>
               <a:rPr lang="en-AU" i="1" dirty="0"/>
-              <a:t>What if we want to add a new task?</a:t>
-            </a:r>
+              <a:t>What if we want to add a new </a:t>
+            </a:r>
+            <a:r>
+              <a:rPr lang="en-AU" i="1" dirty="0" smtClean="0"/>
+              <a:t>behaviour?</a:t>
+            </a:r>
+            <a:endParaRPr lang="en-AU" i="1" dirty="0"/>
           </a:p>
           <a:p>
             <a:pPr marL="0" indent="0">
               <a:buFont typeface="Arial" panose="020B0604020202020204" pitchFamily="34" charset="0"/>
               <a:buNone/>
             </a:pPr>
+            <a:endParaRPr lang="en-AU" dirty="0"/>
+          </a:p>
+        </p:txBody>
+      </p:sp>
+      <p:sp>
+        <p:nvSpPr>
+          <p:cNvPr id="9" name="TextBox 8"/>
+          <p:cNvSpPr txBox="1"/>
+          <p:nvPr/>
+        </p:nvSpPr>
+        <p:spPr>
+          <a:xfrm>
+            <a:off x="6685228" y="5817508"/>
+            <a:ext cx="4905014" cy="369332"/>
+          </a:xfrm>
+          <a:prstGeom prst="rect">
+            <a:avLst/>
+          </a:prstGeom>
+          <a:noFill/>
+        </p:spPr>
+        <p:txBody>
+          <a:bodyPr wrap="square" rtlCol="0">
+            <a:spAutoFit/>
+          </a:bodyPr>
+          <a:lstStyle/>
+          <a:p>
+            <a:pPr marL="0" lvl="1"/>
+            <a:r>
+              <a:rPr lang="en-US" sz="900" dirty="0" smtClean="0"/>
+              <a:t>Images taken from: </a:t>
+            </a:r>
+            <a:r>
+              <a:rPr lang="en-AU" sz="900" dirty="0">
+                <a:hlinkClick r:id="rId4"/>
+              </a:rPr>
+              <a:t>https://dzone.com/articles/page-objects-refactored-solid-steps-to-the-screenp</a:t>
+            </a:r>
+            <a:endParaRPr lang="en-AU" sz="900" dirty="0"/>
+          </a:p>
+          <a:p>
+            <a:endParaRPr lang="en-US" sz="900" dirty="0"/>
+          </a:p>
+        </p:txBody>
+      </p:sp>
+      <p:sp>
+        <p:nvSpPr>
+          <p:cNvPr id="10" name="Content Placeholder 2">
+            <a:extLst>
+              <a:ext uri="{FF2B5EF4-FFF2-40B4-BE49-F238E27FC236}">
+                <a16:creationId xmlns:a16="http://schemas.microsoft.com/office/drawing/2014/main" xmlns="" id="{4AE5F24B-F5BB-4ADA-A872-75DD35F750C2}"/>
+              </a:ext>
+            </a:extLst>
+          </p:cNvPr>
+          <p:cNvSpPr txBox="1">
+            <a:spLocks/>
+          </p:cNvSpPr>
+          <p:nvPr/>
+        </p:nvSpPr>
+        <p:spPr>
+          <a:xfrm>
+            <a:off x="1819907" y="1343966"/>
+            <a:ext cx="2960682" cy="516192"/>
+          </a:xfrm>
+          <a:prstGeom prst="rect">
+            <a:avLst/>
+          </a:prstGeom>
+        </p:spPr>
+        <p:txBody>
+          <a:bodyPr vert="horz" lIns="91440" tIns="45720" rIns="91440" bIns="45720" rtlCol="0">
+            <a:normAutofit fontScale="70000" lnSpcReduction="20000"/>
+          </a:bodyPr>
+          <a:lstStyle>
+            <a:lvl1pPr marL="228600" indent="-228600" algn="l" defTabSz="914400" rtl="0" eaLnBrk="1" latinLnBrk="0" hangingPunct="1">
+              <a:lnSpc>
+                <a:spcPct val="90000"/>
+              </a:lnSpc>
+              <a:spcBef>
+                <a:spcPts val="1000"/>
+              </a:spcBef>
+              <a:buFont typeface="Arial" panose="020B0604020202020204" pitchFamily="34" charset="0"/>
+              <a:buChar char="•"/>
+              <a:defRPr sz="2800" kern="1200">
+                <a:solidFill>
+                  <a:schemeClr val="tx1"/>
+                </a:solidFill>
+                <a:latin typeface="+mn-lt"/>
+                <a:ea typeface="+mn-ea"/>
+                <a:cs typeface="+mn-cs"/>
+              </a:defRPr>
+            </a:lvl1pPr>
+            <a:lvl2pPr marL="685800" indent="-228600" algn="l" defTabSz="914400" rtl="0" eaLnBrk="1" latinLnBrk="0" hangingPunct="1">
+              <a:lnSpc>
+                <a:spcPct val="90000"/>
+              </a:lnSpc>
+              <a:spcBef>
+                <a:spcPts val="500"/>
+              </a:spcBef>
+              <a:buFont typeface="Arial" panose="020B0604020202020204" pitchFamily="34" charset="0"/>
+              <a:buChar char="•"/>
+              <a:defRPr sz="2400" kern="1200">
+                <a:solidFill>
+                  <a:schemeClr val="tx1"/>
+                </a:solidFill>
+                <a:latin typeface="+mn-lt"/>
+                <a:ea typeface="+mn-ea"/>
+                <a:cs typeface="+mn-cs"/>
+              </a:defRPr>
+            </a:lvl2pPr>
+            <a:lvl3pPr marL="1143000" indent="-228600" algn="l" defTabSz="914400" rtl="0" eaLnBrk="1" latinLnBrk="0" hangingPunct="1">
+              <a:lnSpc>
+                <a:spcPct val="90000"/>
+              </a:lnSpc>
+              <a:spcBef>
+                <a:spcPts val="500"/>
+              </a:spcBef>
+              <a:buFont typeface="Arial" panose="020B0604020202020204" pitchFamily="34" charset="0"/>
+              <a:buChar char="•"/>
+              <a:defRPr sz="2000" kern="1200">
+                <a:solidFill>
+                  <a:schemeClr val="tx1"/>
+                </a:solidFill>
+                <a:latin typeface="+mn-lt"/>
+                <a:ea typeface="+mn-ea"/>
+                <a:cs typeface="+mn-cs"/>
+              </a:defRPr>
+            </a:lvl3pPr>
+            <a:lvl4pPr marL="1600200" indent="-228600" algn="l" defTabSz="914400" rtl="0" eaLnBrk="1" latinLnBrk="0" hangingPunct="1">
+              <a:lnSpc>
+                <a:spcPct val="90000"/>
+              </a:lnSpc>
+              <a:spcBef>
+                <a:spcPts val="500"/>
+              </a:spcBef>
+              <a:buFont typeface="Arial" panose="020B0604020202020204" pitchFamily="34" charset="0"/>
+              <a:buChar char="•"/>
+              <a:defRPr sz="1800" kern="1200">
+                <a:solidFill>
+                  <a:schemeClr val="tx1"/>
+                </a:solidFill>
+                <a:latin typeface="+mn-lt"/>
+                <a:ea typeface="+mn-ea"/>
+                <a:cs typeface="+mn-cs"/>
+              </a:defRPr>
+            </a:lvl4pPr>
+            <a:lvl5pPr marL="2057400" indent="-228600" algn="l" defTabSz="914400" rtl="0" eaLnBrk="1" latinLnBrk="0" hangingPunct="1">
+              <a:lnSpc>
+                <a:spcPct val="90000"/>
+              </a:lnSpc>
+              <a:spcBef>
+                <a:spcPts val="500"/>
+              </a:spcBef>
+              <a:buFont typeface="Arial" panose="020B0604020202020204" pitchFamily="34" charset="0"/>
+              <a:buChar char="•"/>
+              <a:defRPr sz="1800" kern="1200">
+                <a:solidFill>
+                  <a:schemeClr val="tx1"/>
+                </a:solidFill>
+                <a:latin typeface="+mn-lt"/>
+                <a:ea typeface="+mn-ea"/>
+                <a:cs typeface="+mn-cs"/>
+              </a:defRPr>
+            </a:lvl5pPr>
+            <a:lvl6pPr marL="2514600" indent="-228600" algn="l" defTabSz="914400" rtl="0" eaLnBrk="1" latinLnBrk="0" hangingPunct="1">
+              <a:lnSpc>
+                <a:spcPct val="90000"/>
+              </a:lnSpc>
+              <a:spcBef>
+                <a:spcPts val="500"/>
+              </a:spcBef>
+              <a:buFont typeface="Arial" panose="020B0604020202020204" pitchFamily="34" charset="0"/>
+              <a:buChar char="•"/>
+              <a:defRPr sz="1800" kern="1200">
+                <a:solidFill>
+                  <a:schemeClr val="tx1"/>
+                </a:solidFill>
+                <a:latin typeface="+mn-lt"/>
+                <a:ea typeface="+mn-ea"/>
+                <a:cs typeface="+mn-cs"/>
+              </a:defRPr>
+            </a:lvl6pPr>
+            <a:lvl7pPr marL="2971800" indent="-228600" algn="l" defTabSz="914400" rtl="0" eaLnBrk="1" latinLnBrk="0" hangingPunct="1">
+              <a:lnSpc>
+                <a:spcPct val="90000"/>
+              </a:lnSpc>
+              <a:spcBef>
+                <a:spcPts val="500"/>
+              </a:spcBef>
+              <a:buFont typeface="Arial" panose="020B0604020202020204" pitchFamily="34" charset="0"/>
+              <a:buChar char="•"/>
+              <a:defRPr sz="1800" kern="1200">
+                <a:solidFill>
+                  <a:schemeClr val="tx1"/>
+                </a:solidFill>
+                <a:latin typeface="+mn-lt"/>
+                <a:ea typeface="+mn-ea"/>
+                <a:cs typeface="+mn-cs"/>
+              </a:defRPr>
+            </a:lvl7pPr>
+            <a:lvl8pPr marL="3429000" indent="-228600" algn="l" defTabSz="914400" rtl="0" eaLnBrk="1" latinLnBrk="0" hangingPunct="1">
+              <a:lnSpc>
+                <a:spcPct val="90000"/>
+              </a:lnSpc>
+              <a:spcBef>
+                <a:spcPts val="500"/>
+              </a:spcBef>
+              <a:buFont typeface="Arial" panose="020B0604020202020204" pitchFamily="34" charset="0"/>
+              <a:buChar char="•"/>
+              <a:defRPr sz="1800" kern="1200">
+                <a:solidFill>
+                  <a:schemeClr val="tx1"/>
+                </a:solidFill>
+                <a:latin typeface="+mn-lt"/>
+                <a:ea typeface="+mn-ea"/>
+                <a:cs typeface="+mn-cs"/>
+              </a:defRPr>
+            </a:lvl8pPr>
+            <a:lvl9pPr marL="3886200" indent="-228600" algn="l" defTabSz="914400" rtl="0" eaLnBrk="1" latinLnBrk="0" hangingPunct="1">
+              <a:lnSpc>
+                <a:spcPct val="90000"/>
+              </a:lnSpc>
+              <a:spcBef>
+                <a:spcPts val="500"/>
+              </a:spcBef>
+              <a:buFont typeface="Arial" panose="020B0604020202020204" pitchFamily="34" charset="0"/>
+              <a:buChar char="•"/>
+              <a:defRPr sz="1800" kern="1200">
+                <a:solidFill>
+                  <a:schemeClr val="tx1"/>
+                </a:solidFill>
+                <a:latin typeface="+mn-lt"/>
+                <a:ea typeface="+mn-ea"/>
+                <a:cs typeface="+mn-cs"/>
+              </a:defRPr>
+            </a:lvl9pPr>
+          </a:lstStyle>
+          <a:p>
+            <a:pPr marL="0" indent="0">
+              <a:buFont typeface="Arial" panose="020B0604020202020204" pitchFamily="34" charset="0"/>
+              <a:buNone/>
+            </a:pPr>
+            <a:r>
+              <a:rPr lang="en-AU" dirty="0" smtClean="0"/>
+              <a:t>Break down by behaviours</a:t>
+            </a:r>
+            <a:endParaRPr lang="en-AU" dirty="0"/>
+          </a:p>
+        </p:txBody>
+      </p:sp>
+      <p:sp>
+        <p:nvSpPr>
+          <p:cNvPr id="13" name="Content Placeholder 2">
+            <a:extLst>
+              <a:ext uri="{FF2B5EF4-FFF2-40B4-BE49-F238E27FC236}">
+                <a16:creationId xmlns:a16="http://schemas.microsoft.com/office/drawing/2014/main" xmlns="" id="{4AE5F24B-F5BB-4ADA-A872-75DD35F750C2}"/>
+              </a:ext>
+            </a:extLst>
+          </p:cNvPr>
+          <p:cNvSpPr txBox="1">
+            <a:spLocks/>
+          </p:cNvSpPr>
+          <p:nvPr/>
+        </p:nvSpPr>
+        <p:spPr>
+          <a:xfrm>
+            <a:off x="7283006" y="1338634"/>
+            <a:ext cx="2960682" cy="516192"/>
+          </a:xfrm>
+          <a:prstGeom prst="rect">
+            <a:avLst/>
+          </a:prstGeom>
+        </p:spPr>
+        <p:txBody>
+          <a:bodyPr vert="horz" lIns="91440" tIns="45720" rIns="91440" bIns="45720" rtlCol="0">
+            <a:normAutofit fontScale="62500" lnSpcReduction="20000"/>
+          </a:bodyPr>
+          <a:lstStyle>
+            <a:lvl1pPr marL="228600" indent="-228600" algn="l" defTabSz="914400" rtl="0" eaLnBrk="1" latinLnBrk="0" hangingPunct="1">
+              <a:lnSpc>
+                <a:spcPct val="90000"/>
+              </a:lnSpc>
+              <a:spcBef>
+                <a:spcPts val="1000"/>
+              </a:spcBef>
+              <a:buFont typeface="Arial" panose="020B0604020202020204" pitchFamily="34" charset="0"/>
+              <a:buChar char="•"/>
+              <a:defRPr sz="2800" kern="1200">
+                <a:solidFill>
+                  <a:schemeClr val="tx1"/>
+                </a:solidFill>
+                <a:latin typeface="+mn-lt"/>
+                <a:ea typeface="+mn-ea"/>
+                <a:cs typeface="+mn-cs"/>
+              </a:defRPr>
+            </a:lvl1pPr>
+            <a:lvl2pPr marL="685800" indent="-228600" algn="l" defTabSz="914400" rtl="0" eaLnBrk="1" latinLnBrk="0" hangingPunct="1">
+              <a:lnSpc>
+                <a:spcPct val="90000"/>
+              </a:lnSpc>
+              <a:spcBef>
+                <a:spcPts val="500"/>
+              </a:spcBef>
+              <a:buFont typeface="Arial" panose="020B0604020202020204" pitchFamily="34" charset="0"/>
+              <a:buChar char="•"/>
+              <a:defRPr sz="2400" kern="1200">
+                <a:solidFill>
+                  <a:schemeClr val="tx1"/>
+                </a:solidFill>
+                <a:latin typeface="+mn-lt"/>
+                <a:ea typeface="+mn-ea"/>
+                <a:cs typeface="+mn-cs"/>
+              </a:defRPr>
+            </a:lvl2pPr>
+            <a:lvl3pPr marL="1143000" indent="-228600" algn="l" defTabSz="914400" rtl="0" eaLnBrk="1" latinLnBrk="0" hangingPunct="1">
+              <a:lnSpc>
+                <a:spcPct val="90000"/>
+              </a:lnSpc>
+              <a:spcBef>
+                <a:spcPts val="500"/>
+              </a:spcBef>
+              <a:buFont typeface="Arial" panose="020B0604020202020204" pitchFamily="34" charset="0"/>
+              <a:buChar char="•"/>
+              <a:defRPr sz="2000" kern="1200">
+                <a:solidFill>
+                  <a:schemeClr val="tx1"/>
+                </a:solidFill>
+                <a:latin typeface="+mn-lt"/>
+                <a:ea typeface="+mn-ea"/>
+                <a:cs typeface="+mn-cs"/>
+              </a:defRPr>
+            </a:lvl3pPr>
+            <a:lvl4pPr marL="1600200" indent="-228600" algn="l" defTabSz="914400" rtl="0" eaLnBrk="1" latinLnBrk="0" hangingPunct="1">
+              <a:lnSpc>
+                <a:spcPct val="90000"/>
+              </a:lnSpc>
+              <a:spcBef>
+                <a:spcPts val="500"/>
+              </a:spcBef>
+              <a:buFont typeface="Arial" panose="020B0604020202020204" pitchFamily="34" charset="0"/>
+              <a:buChar char="•"/>
+              <a:defRPr sz="1800" kern="1200">
+                <a:solidFill>
+                  <a:schemeClr val="tx1"/>
+                </a:solidFill>
+                <a:latin typeface="+mn-lt"/>
+                <a:ea typeface="+mn-ea"/>
+                <a:cs typeface="+mn-cs"/>
+              </a:defRPr>
+            </a:lvl4pPr>
+            <a:lvl5pPr marL="2057400" indent="-228600" algn="l" defTabSz="914400" rtl="0" eaLnBrk="1" latinLnBrk="0" hangingPunct="1">
+              <a:lnSpc>
+                <a:spcPct val="90000"/>
+              </a:lnSpc>
+              <a:spcBef>
+                <a:spcPts val="500"/>
+              </a:spcBef>
+              <a:buFont typeface="Arial" panose="020B0604020202020204" pitchFamily="34" charset="0"/>
+              <a:buChar char="•"/>
+              <a:defRPr sz="1800" kern="1200">
+                <a:solidFill>
+                  <a:schemeClr val="tx1"/>
+                </a:solidFill>
+                <a:latin typeface="+mn-lt"/>
+                <a:ea typeface="+mn-ea"/>
+                <a:cs typeface="+mn-cs"/>
+              </a:defRPr>
+            </a:lvl5pPr>
+            <a:lvl6pPr marL="2514600" indent="-228600" algn="l" defTabSz="914400" rtl="0" eaLnBrk="1" latinLnBrk="0" hangingPunct="1">
+              <a:lnSpc>
+                <a:spcPct val="90000"/>
+              </a:lnSpc>
+              <a:spcBef>
+                <a:spcPts val="500"/>
+              </a:spcBef>
+              <a:buFont typeface="Arial" panose="020B0604020202020204" pitchFamily="34" charset="0"/>
+              <a:buChar char="•"/>
+              <a:defRPr sz="1800" kern="1200">
+                <a:solidFill>
+                  <a:schemeClr val="tx1"/>
+                </a:solidFill>
+                <a:latin typeface="+mn-lt"/>
+                <a:ea typeface="+mn-ea"/>
+                <a:cs typeface="+mn-cs"/>
+              </a:defRPr>
+            </a:lvl6pPr>
+            <a:lvl7pPr marL="2971800" indent="-228600" algn="l" defTabSz="914400" rtl="0" eaLnBrk="1" latinLnBrk="0" hangingPunct="1">
+              <a:lnSpc>
+                <a:spcPct val="90000"/>
+              </a:lnSpc>
+              <a:spcBef>
+                <a:spcPts val="500"/>
+              </a:spcBef>
+              <a:buFont typeface="Arial" panose="020B0604020202020204" pitchFamily="34" charset="0"/>
+              <a:buChar char="•"/>
+              <a:defRPr sz="1800" kern="1200">
+                <a:solidFill>
+                  <a:schemeClr val="tx1"/>
+                </a:solidFill>
+                <a:latin typeface="+mn-lt"/>
+                <a:ea typeface="+mn-ea"/>
+                <a:cs typeface="+mn-cs"/>
+              </a:defRPr>
+            </a:lvl7pPr>
+            <a:lvl8pPr marL="3429000" indent="-228600" algn="l" defTabSz="914400" rtl="0" eaLnBrk="1" latinLnBrk="0" hangingPunct="1">
+              <a:lnSpc>
+                <a:spcPct val="90000"/>
+              </a:lnSpc>
+              <a:spcBef>
+                <a:spcPts val="500"/>
+              </a:spcBef>
+              <a:buFont typeface="Arial" panose="020B0604020202020204" pitchFamily="34" charset="0"/>
+              <a:buChar char="•"/>
+              <a:defRPr sz="1800" kern="1200">
+                <a:solidFill>
+                  <a:schemeClr val="tx1"/>
+                </a:solidFill>
+                <a:latin typeface="+mn-lt"/>
+                <a:ea typeface="+mn-ea"/>
+                <a:cs typeface="+mn-cs"/>
+              </a:defRPr>
+            </a:lvl8pPr>
+            <a:lvl9pPr marL="3886200" indent="-228600" algn="l" defTabSz="914400" rtl="0" eaLnBrk="1" latinLnBrk="0" hangingPunct="1">
+              <a:lnSpc>
+                <a:spcPct val="90000"/>
+              </a:lnSpc>
+              <a:spcBef>
+                <a:spcPts val="500"/>
+              </a:spcBef>
+              <a:buFont typeface="Arial" panose="020B0604020202020204" pitchFamily="34" charset="0"/>
+              <a:buChar char="•"/>
+              <a:defRPr sz="1800" kern="1200">
+                <a:solidFill>
+                  <a:schemeClr val="tx1"/>
+                </a:solidFill>
+                <a:latin typeface="+mn-lt"/>
+                <a:ea typeface="+mn-ea"/>
+                <a:cs typeface="+mn-cs"/>
+              </a:defRPr>
+            </a:lvl9pPr>
+          </a:lstStyle>
+          <a:p>
+            <a:pPr marL="0" indent="0">
+              <a:buFont typeface="Arial" panose="020B0604020202020204" pitchFamily="34" charset="0"/>
+              <a:buNone/>
+            </a:pPr>
+            <a:r>
+              <a:rPr lang="en-AU" dirty="0" smtClean="0"/>
+              <a:t>Break down by responsibility</a:t>
+            </a:r>
             <a:endParaRPr lang="en-AU" dirty="0"/>
           </a:p>
         </p:txBody>
@@ -4271,6 +4796,13 @@
   <p:clrMapOvr>
     <a:masterClrMapping/>
   </p:clrMapOvr>
+  <p:timing>
+    <p:tnLst>
+      <p:par>
+        <p:cTn id="1" dur="indefinite" restart="never" nodeType="tmRoot"/>
+      </p:par>
+    </p:tnLst>
+  </p:timing>
 </p:sld>
 </file>
 
@@ -4340,7 +4872,7 @@
           <p:cNvPr id="4098" name="Picture 2" descr="https://d262ilb51hltx0.cloudfront.net/max/800/0*FEf0kOPNjDg7rakV.">
             <a:extLst>
               <a:ext uri="{FF2B5EF4-FFF2-40B4-BE49-F238E27FC236}">
-                <a16:creationId xmlns:a16="http://schemas.microsoft.com/office/drawing/2014/main" id="{4DD7C325-04BD-4744-8DBC-F61C0DDED52F}"/>
+                <a16:creationId xmlns:a16="http://schemas.microsoft.com/office/drawing/2014/main" xmlns="" id="{4DD7C325-04BD-4744-8DBC-F61C0DDED52F}"/>
               </a:ext>
             </a:extLst>
           </p:cNvPr>
@@ -4387,7 +4919,7 @@
           <p:cNvPr id="13" name="Content Placeholder 2">
             <a:extLst>
               <a:ext uri="{FF2B5EF4-FFF2-40B4-BE49-F238E27FC236}">
-                <a16:creationId xmlns:a16="http://schemas.microsoft.com/office/drawing/2014/main" id="{ECD37DC3-1ADF-4AB0-B4D0-B99F104E3B30}"/>
+                <a16:creationId xmlns:a16="http://schemas.microsoft.com/office/drawing/2014/main" xmlns="" id="{ECD37DC3-1ADF-4AB0-B4D0-B99F104E3B30}"/>
               </a:ext>
             </a:extLst>
           </p:cNvPr>
@@ -4459,6 +4991,46 @@
               <a:buNone/>
             </a:pPr>
             <a:endParaRPr lang="en-AU" dirty="0"/>
+          </a:p>
+        </p:txBody>
+      </p:sp>
+      <p:sp>
+        <p:nvSpPr>
+          <p:cNvPr id="5" name="TextBox 4"/>
+          <p:cNvSpPr txBox="1"/>
+          <p:nvPr/>
+        </p:nvSpPr>
+        <p:spPr>
+          <a:xfrm>
+            <a:off x="838200" y="5973890"/>
+            <a:ext cx="4905014" cy="369332"/>
+          </a:xfrm>
+          <a:prstGeom prst="rect">
+            <a:avLst/>
+          </a:prstGeom>
+          <a:noFill/>
+        </p:spPr>
+        <p:txBody>
+          <a:bodyPr wrap="square" rtlCol="0">
+            <a:spAutoFit/>
+          </a:bodyPr>
+          <a:lstStyle/>
+          <a:p>
+            <a:pPr marL="0" lvl="1"/>
+            <a:r>
+              <a:rPr lang="en-US" sz="900" dirty="0" smtClean="0"/>
+              <a:t>Images taken from: </a:t>
+            </a:r>
+            <a:r>
+              <a:rPr lang="en-AU" sz="900" dirty="0">
+                <a:hlinkClick r:id="rId3"/>
+              </a:rPr>
+              <a:t>https://dzone.com/articles/page-objects-refactored-solid-steps-to-the-screenp</a:t>
+            </a:r>
+            <a:endParaRPr lang="en-AU" sz="900" dirty="0"/>
+          </a:p>
+          <a:p>
+            <a:endParaRPr lang="en-US" sz="900" dirty="0"/>
           </a:p>
         </p:txBody>
       </p:sp>
@@ -4472,6 +5044,13 @@
   <p:clrMapOvr>
     <a:masterClrMapping/>
   </p:clrMapOvr>
+  <p:timing>
+    <p:tnLst>
+      <p:par>
+        <p:cTn id="1" dur="indefinite" restart="never" nodeType="tmRoot"/>
+      </p:par>
+    </p:tnLst>
+  </p:timing>
 </p:sld>
 </file>
 
@@ -4531,7 +5110,7 @@
           <p:cNvPr id="5140" name="Picture 20" descr="https://d262ilb51hltx0.cloudfront.net/max/800/0*8U2LHYJVl5uNTOFj.">
             <a:extLst>
               <a:ext uri="{FF2B5EF4-FFF2-40B4-BE49-F238E27FC236}">
-                <a16:creationId xmlns:a16="http://schemas.microsoft.com/office/drawing/2014/main" id="{5E0BED4C-473F-4E24-99E2-CF87E94E86B4}"/>
+                <a16:creationId xmlns:a16="http://schemas.microsoft.com/office/drawing/2014/main" xmlns="" id="{5E0BED4C-473F-4E24-99E2-CF87E94E86B4}"/>
               </a:ext>
             </a:extLst>
           </p:cNvPr>
@@ -4578,7 +5157,7 @@
           <p:cNvPr id="23" name="Content Placeholder 2">
             <a:extLst>
               <a:ext uri="{FF2B5EF4-FFF2-40B4-BE49-F238E27FC236}">
-                <a16:creationId xmlns:a16="http://schemas.microsoft.com/office/drawing/2014/main" id="{E434DB1F-848E-41BF-9D23-3F4236CBBA9E}"/>
+                <a16:creationId xmlns:a16="http://schemas.microsoft.com/office/drawing/2014/main" xmlns="" id="{E434DB1F-848E-41BF-9D23-3F4236CBBA9E}"/>
               </a:ext>
             </a:extLst>
           </p:cNvPr>
@@ -4592,12 +5171,12 @@
         <p:spPr>
           <a:xfrm>
             <a:off x="646472" y="2189111"/>
-            <a:ext cx="4835525" cy="3270814"/>
+            <a:ext cx="4835525" cy="3944060"/>
           </a:xfrm>
         </p:spPr>
         <p:txBody>
           <a:bodyPr>
-            <a:normAutofit/>
+            <a:normAutofit fontScale="92500" lnSpcReduction="20000"/>
           </a:bodyPr>
           <a:lstStyle/>
           <a:p>
@@ -4605,8 +5184,12 @@
               <a:buNone/>
             </a:pPr>
             <a:r>
-              <a:rPr lang="en-AU" dirty="0"/>
-              <a:t>In UX design we break down by:</a:t>
+              <a:rPr lang="en-AU" dirty="0" smtClean="0"/>
+              <a:t>In </a:t>
+            </a:r>
+            <a:r>
+              <a:rPr lang="en-AU" dirty="0"/>
+              <a:t>UX design we break down by:</a:t>
             </a:r>
           </a:p>
           <a:p>
@@ -4624,8 +5207,68 @@
           <a:p>
             <a:r>
               <a:rPr lang="en-AU" dirty="0"/>
-              <a:t>Actions – how user interacts with the system</a:t>
-            </a:r>
+              <a:t>Actions – how user interacts with the </a:t>
+            </a:r>
+            <a:r>
+              <a:rPr lang="en-AU" dirty="0" smtClean="0"/>
+              <a:t>system</a:t>
+            </a:r>
+          </a:p>
+          <a:p>
+            <a:endParaRPr lang="en-AU" dirty="0"/>
+          </a:p>
+          <a:p>
+            <a:r>
+              <a:rPr lang="en-AU" dirty="0" smtClean="0"/>
+              <a:t>Behaviours drive our test.</a:t>
+            </a:r>
+          </a:p>
+          <a:p>
+            <a:r>
+              <a:rPr lang="en-AU" dirty="0" smtClean="0"/>
+              <a:t>This perspective + O.O = screenplay</a:t>
+            </a:r>
+            <a:endParaRPr lang="en-AU" dirty="0" smtClean="0"/>
+          </a:p>
+        </p:txBody>
+      </p:sp>
+      <p:sp>
+        <p:nvSpPr>
+          <p:cNvPr id="5" name="TextBox 4"/>
+          <p:cNvSpPr txBox="1"/>
+          <p:nvPr/>
+        </p:nvSpPr>
+        <p:spPr>
+          <a:xfrm>
+            <a:off x="6448786" y="5958347"/>
+            <a:ext cx="4905014" cy="369332"/>
+          </a:xfrm>
+          <a:prstGeom prst="rect">
+            <a:avLst/>
+          </a:prstGeom>
+          <a:noFill/>
+        </p:spPr>
+        <p:txBody>
+          <a:bodyPr wrap="square" rtlCol="0">
+            <a:spAutoFit/>
+          </a:bodyPr>
+          <a:lstStyle/>
+          <a:p>
+            <a:pPr marL="0" lvl="1"/>
+            <a:r>
+              <a:rPr lang="en-US" sz="900" dirty="0" smtClean="0"/>
+              <a:t>Images taken from: </a:t>
+            </a:r>
+            <a:r>
+              <a:rPr lang="en-AU" sz="900" dirty="0">
+                <a:hlinkClick r:id="rId3"/>
+              </a:rPr>
+              <a:t>https://dzone.com/articles/page-objects-refactored-solid-steps-to-the-screenp</a:t>
+            </a:r>
+            <a:endParaRPr lang="en-AU" sz="900" dirty="0"/>
+          </a:p>
+          <a:p>
+            <a:endParaRPr lang="en-US" sz="900" dirty="0"/>
           </a:p>
         </p:txBody>
       </p:sp>
@@ -4639,6 +5282,13 @@
   <p:clrMapOvr>
     <a:masterClrMapping/>
   </p:clrMapOvr>
+  <p:timing>
+    <p:tnLst>
+      <p:par>
+        <p:cTn id="1" dur="indefinite" restart="never" nodeType="tmRoot"/>
+      </p:par>
+    </p:tnLst>
+  </p:timing>
 </p:sld>
 </file>
 
@@ -4687,7 +5337,11 @@
           <a:p>
             <a:r>
               <a:rPr lang="en-AU" dirty="0"/>
-              <a:t>Screenplay - feature &amp; scenario/test</a:t>
+              <a:t>Screenplay - feature &amp; </a:t>
+            </a:r>
+            <a:r>
+              <a:rPr lang="en-AU" dirty="0" smtClean="0"/>
+              <a:t>scenario/test</a:t>
             </a:r>
             <a:endParaRPr lang="en-US" dirty="0"/>
           </a:p>
@@ -4698,7 +5352,7 @@
           <p:cNvPr id="8194" name="Picture 2" descr="https://d262ilb51hltx0.cloudfront.net/max/800/0*u8MCnsbNJZeV36Ju.">
             <a:extLst>
               <a:ext uri="{FF2B5EF4-FFF2-40B4-BE49-F238E27FC236}">
-                <a16:creationId xmlns:a16="http://schemas.microsoft.com/office/drawing/2014/main" id="{72B69E7F-B760-4649-B857-EE19D5A36CDB}"/>
+                <a16:creationId xmlns:a16="http://schemas.microsoft.com/office/drawing/2014/main" xmlns="" id="{72B69E7F-B760-4649-B857-EE19D5A36CDB}"/>
               </a:ext>
             </a:extLst>
           </p:cNvPr>
@@ -4722,7 +5376,7 @@
         </p:blipFill>
         <p:spPr bwMode="auto">
           <a:xfrm>
-            <a:off x="464268" y="2026149"/>
+            <a:off x="464268" y="2539868"/>
             <a:ext cx="4251837" cy="3513621"/>
           </a:xfrm>
           <a:prstGeom prst="rect">
@@ -4745,7 +5399,7 @@
           <p:cNvPr id="5" name="Picture 4">
             <a:extLst>
               <a:ext uri="{FF2B5EF4-FFF2-40B4-BE49-F238E27FC236}">
-                <a16:creationId xmlns:a16="http://schemas.microsoft.com/office/drawing/2014/main" id="{F22524FC-26A8-4B1D-886E-F69EB9D18BBF}"/>
+                <a16:creationId xmlns:a16="http://schemas.microsoft.com/office/drawing/2014/main" xmlns="" id="{F22524FC-26A8-4B1D-886E-F69EB9D18BBF}"/>
               </a:ext>
             </a:extLst>
           </p:cNvPr>
@@ -4762,7 +5416,7 @@
         </p:blipFill>
         <p:spPr>
           <a:xfrm>
-            <a:off x="4878337" y="2491770"/>
+            <a:off x="4878337" y="3005489"/>
             <a:ext cx="6772890" cy="3048000"/>
           </a:xfrm>
           <a:prstGeom prst="rect">
@@ -4775,7 +5429,7 @@
           <p:cNvPr id="9" name="Content Placeholder 2">
             <a:extLst>
               <a:ext uri="{FF2B5EF4-FFF2-40B4-BE49-F238E27FC236}">
-                <a16:creationId xmlns:a16="http://schemas.microsoft.com/office/drawing/2014/main" id="{610ED6C4-08CC-470B-BBD0-2AB1C2F222E9}"/>
+                <a16:creationId xmlns:a16="http://schemas.microsoft.com/office/drawing/2014/main" xmlns="" id="{610ED6C4-08CC-470B-BBD0-2AB1C2F222E9}"/>
               </a:ext>
             </a:extLst>
           </p:cNvPr>
@@ -4788,13 +5442,13 @@
         </p:nvSpPr>
         <p:spPr>
           <a:xfrm>
-            <a:off x="4878337" y="1679926"/>
+            <a:off x="4878337" y="2062522"/>
             <a:ext cx="6344981" cy="692445"/>
           </a:xfrm>
         </p:spPr>
         <p:txBody>
           <a:bodyPr>
-            <a:normAutofit fontScale="85000" lnSpcReduction="10000"/>
+            <a:normAutofit fontScale="55000" lnSpcReduction="20000"/>
           </a:bodyPr>
           <a:lstStyle/>
           <a:p>
@@ -4803,8 +5457,230 @@
             </a:pPr>
             <a:r>
               <a:rPr lang="en-AU" dirty="0"/>
-              <a:t>Goal: should_be_able_to_add_the_first_todo_item()</a:t>
-            </a:r>
+              <a:t>Goal: </a:t>
+            </a:r>
+            <a:r>
+              <a:rPr lang="en-AU" dirty="0" err="1"/>
+              <a:t>should_be_able_to_add_the_first_todo_item</a:t>
+            </a:r>
+            <a:r>
+              <a:rPr lang="en-AU" dirty="0" smtClean="0"/>
+              <a:t>()</a:t>
+            </a:r>
+          </a:p>
+          <a:p>
+            <a:pPr marL="0" indent="0">
+              <a:buNone/>
+            </a:pPr>
+            <a:r>
+              <a:rPr lang="en-AU" dirty="0" smtClean="0"/>
+              <a:t>- Tests read better if they are presented in the point of view of the user</a:t>
+            </a:r>
+            <a:endParaRPr lang="en-AU" dirty="0"/>
+          </a:p>
+        </p:txBody>
+      </p:sp>
+      <p:sp>
+        <p:nvSpPr>
+          <p:cNvPr id="7" name="Content Placeholder 2">
+            <a:extLst>
+              <a:ext uri="{FF2B5EF4-FFF2-40B4-BE49-F238E27FC236}">
+                <a16:creationId xmlns:a16="http://schemas.microsoft.com/office/drawing/2014/main" xmlns="" id="{610ED6C4-08CC-470B-BBD0-2AB1C2F222E9}"/>
+              </a:ext>
+            </a:extLst>
+          </p:cNvPr>
+          <p:cNvSpPr txBox="1">
+            <a:spLocks/>
+          </p:cNvSpPr>
+          <p:nvPr/>
+        </p:nvSpPr>
+        <p:spPr>
+          <a:xfrm>
+            <a:off x="464268" y="1585175"/>
+            <a:ext cx="6344981" cy="692445"/>
+          </a:xfrm>
+          <a:prstGeom prst="rect">
+            <a:avLst/>
+          </a:prstGeom>
+        </p:spPr>
+        <p:txBody>
+          <a:bodyPr vert="horz" lIns="91440" tIns="45720" rIns="91440" bIns="45720" rtlCol="0">
+            <a:normAutofit/>
+          </a:bodyPr>
+          <a:lstStyle>
+            <a:lvl1pPr marL="228600" indent="-228600" algn="l" defTabSz="914400" rtl="0" eaLnBrk="1" latinLnBrk="0" hangingPunct="1">
+              <a:lnSpc>
+                <a:spcPct val="90000"/>
+              </a:lnSpc>
+              <a:spcBef>
+                <a:spcPts val="1000"/>
+              </a:spcBef>
+              <a:buFont typeface="Arial" panose="020B0604020202020204" pitchFamily="34" charset="0"/>
+              <a:buChar char="•"/>
+              <a:defRPr sz="2800" kern="1200">
+                <a:solidFill>
+                  <a:schemeClr val="tx1"/>
+                </a:solidFill>
+                <a:latin typeface="+mn-lt"/>
+                <a:ea typeface="+mn-ea"/>
+                <a:cs typeface="+mn-cs"/>
+              </a:defRPr>
+            </a:lvl1pPr>
+            <a:lvl2pPr marL="685800" indent="-228600" algn="l" defTabSz="914400" rtl="0" eaLnBrk="1" latinLnBrk="0" hangingPunct="1">
+              <a:lnSpc>
+                <a:spcPct val="90000"/>
+              </a:lnSpc>
+              <a:spcBef>
+                <a:spcPts val="500"/>
+              </a:spcBef>
+              <a:buFont typeface="Arial" panose="020B0604020202020204" pitchFamily="34" charset="0"/>
+              <a:buChar char="•"/>
+              <a:defRPr sz="2400" kern="1200">
+                <a:solidFill>
+                  <a:schemeClr val="tx1"/>
+                </a:solidFill>
+                <a:latin typeface="+mn-lt"/>
+                <a:ea typeface="+mn-ea"/>
+                <a:cs typeface="+mn-cs"/>
+              </a:defRPr>
+            </a:lvl2pPr>
+            <a:lvl3pPr marL="1143000" indent="-228600" algn="l" defTabSz="914400" rtl="0" eaLnBrk="1" latinLnBrk="0" hangingPunct="1">
+              <a:lnSpc>
+                <a:spcPct val="90000"/>
+              </a:lnSpc>
+              <a:spcBef>
+                <a:spcPts val="500"/>
+              </a:spcBef>
+              <a:buFont typeface="Arial" panose="020B0604020202020204" pitchFamily="34" charset="0"/>
+              <a:buChar char="•"/>
+              <a:defRPr sz="2000" kern="1200">
+                <a:solidFill>
+                  <a:schemeClr val="tx1"/>
+                </a:solidFill>
+                <a:latin typeface="+mn-lt"/>
+                <a:ea typeface="+mn-ea"/>
+                <a:cs typeface="+mn-cs"/>
+              </a:defRPr>
+            </a:lvl3pPr>
+            <a:lvl4pPr marL="1600200" indent="-228600" algn="l" defTabSz="914400" rtl="0" eaLnBrk="1" latinLnBrk="0" hangingPunct="1">
+              <a:lnSpc>
+                <a:spcPct val="90000"/>
+              </a:lnSpc>
+              <a:spcBef>
+                <a:spcPts val="500"/>
+              </a:spcBef>
+              <a:buFont typeface="Arial" panose="020B0604020202020204" pitchFamily="34" charset="0"/>
+              <a:buChar char="•"/>
+              <a:defRPr sz="1800" kern="1200">
+                <a:solidFill>
+                  <a:schemeClr val="tx1"/>
+                </a:solidFill>
+                <a:latin typeface="+mn-lt"/>
+                <a:ea typeface="+mn-ea"/>
+                <a:cs typeface="+mn-cs"/>
+              </a:defRPr>
+            </a:lvl4pPr>
+            <a:lvl5pPr marL="2057400" indent="-228600" algn="l" defTabSz="914400" rtl="0" eaLnBrk="1" latinLnBrk="0" hangingPunct="1">
+              <a:lnSpc>
+                <a:spcPct val="90000"/>
+              </a:lnSpc>
+              <a:spcBef>
+                <a:spcPts val="500"/>
+              </a:spcBef>
+              <a:buFont typeface="Arial" panose="020B0604020202020204" pitchFamily="34" charset="0"/>
+              <a:buChar char="•"/>
+              <a:defRPr sz="1800" kern="1200">
+                <a:solidFill>
+                  <a:schemeClr val="tx1"/>
+                </a:solidFill>
+                <a:latin typeface="+mn-lt"/>
+                <a:ea typeface="+mn-ea"/>
+                <a:cs typeface="+mn-cs"/>
+              </a:defRPr>
+            </a:lvl5pPr>
+            <a:lvl6pPr marL="2514600" indent="-228600" algn="l" defTabSz="914400" rtl="0" eaLnBrk="1" latinLnBrk="0" hangingPunct="1">
+              <a:lnSpc>
+                <a:spcPct val="90000"/>
+              </a:lnSpc>
+              <a:spcBef>
+                <a:spcPts val="500"/>
+              </a:spcBef>
+              <a:buFont typeface="Arial" panose="020B0604020202020204" pitchFamily="34" charset="0"/>
+              <a:buChar char="•"/>
+              <a:defRPr sz="1800" kern="1200">
+                <a:solidFill>
+                  <a:schemeClr val="tx1"/>
+                </a:solidFill>
+                <a:latin typeface="+mn-lt"/>
+                <a:ea typeface="+mn-ea"/>
+                <a:cs typeface="+mn-cs"/>
+              </a:defRPr>
+            </a:lvl6pPr>
+            <a:lvl7pPr marL="2971800" indent="-228600" algn="l" defTabSz="914400" rtl="0" eaLnBrk="1" latinLnBrk="0" hangingPunct="1">
+              <a:lnSpc>
+                <a:spcPct val="90000"/>
+              </a:lnSpc>
+              <a:spcBef>
+                <a:spcPts val="500"/>
+              </a:spcBef>
+              <a:buFont typeface="Arial" panose="020B0604020202020204" pitchFamily="34" charset="0"/>
+              <a:buChar char="•"/>
+              <a:defRPr sz="1800" kern="1200">
+                <a:solidFill>
+                  <a:schemeClr val="tx1"/>
+                </a:solidFill>
+                <a:latin typeface="+mn-lt"/>
+                <a:ea typeface="+mn-ea"/>
+                <a:cs typeface="+mn-cs"/>
+              </a:defRPr>
+            </a:lvl7pPr>
+            <a:lvl8pPr marL="3429000" indent="-228600" algn="l" defTabSz="914400" rtl="0" eaLnBrk="1" latinLnBrk="0" hangingPunct="1">
+              <a:lnSpc>
+                <a:spcPct val="90000"/>
+              </a:lnSpc>
+              <a:spcBef>
+                <a:spcPts val="500"/>
+              </a:spcBef>
+              <a:buFont typeface="Arial" panose="020B0604020202020204" pitchFamily="34" charset="0"/>
+              <a:buChar char="•"/>
+              <a:defRPr sz="1800" kern="1200">
+                <a:solidFill>
+                  <a:schemeClr val="tx1"/>
+                </a:solidFill>
+                <a:latin typeface="+mn-lt"/>
+                <a:ea typeface="+mn-ea"/>
+                <a:cs typeface="+mn-cs"/>
+              </a:defRPr>
+            </a:lvl8pPr>
+            <a:lvl9pPr marL="3886200" indent="-228600" algn="l" defTabSz="914400" rtl="0" eaLnBrk="1" latinLnBrk="0" hangingPunct="1">
+              <a:lnSpc>
+                <a:spcPct val="90000"/>
+              </a:lnSpc>
+              <a:spcBef>
+                <a:spcPts val="500"/>
+              </a:spcBef>
+              <a:buFont typeface="Arial" panose="020B0604020202020204" pitchFamily="34" charset="0"/>
+              <a:buChar char="•"/>
+              <a:defRPr sz="1800" kern="1200">
+                <a:solidFill>
+                  <a:schemeClr val="tx1"/>
+                </a:solidFill>
+                <a:latin typeface="+mn-lt"/>
+                <a:ea typeface="+mn-ea"/>
+                <a:cs typeface="+mn-cs"/>
+              </a:defRPr>
+            </a:lvl9pPr>
+          </a:lstStyle>
+          <a:p>
+            <a:pPr marL="0" indent="0">
+              <a:buFont typeface="Arial" panose="020B0604020202020204" pitchFamily="34" charset="0"/>
+              <a:buNone/>
+            </a:pPr>
+            <a:r>
+              <a:rPr lang="en-AU" smtClean="0"/>
+              <a:t>ToDoMVC App</a:t>
+            </a:r>
+            <a:endParaRPr lang="en-AU" dirty="0"/>
           </a:p>
         </p:txBody>
       </p:sp>
@@ -4818,6 +5694,13 @@
   <p:clrMapOvr>
     <a:masterClrMapping/>
   </p:clrMapOvr>
+  <p:timing>
+    <p:tnLst>
+      <p:par>
+        <p:cTn id="1" dur="indefinite" restart="never" nodeType="tmRoot"/>
+      </p:par>
+    </p:tnLst>
+  </p:timing>
 </p:sld>
 </file>
 
@@ -4877,7 +5760,7 @@
           <p:cNvPr id="19" name="Content Placeholder 18">
             <a:extLst>
               <a:ext uri="{FF2B5EF4-FFF2-40B4-BE49-F238E27FC236}">
-                <a16:creationId xmlns:a16="http://schemas.microsoft.com/office/drawing/2014/main" id="{5EE6861F-9A2A-488E-AE1F-ED2346D1384F}"/>
+                <a16:creationId xmlns:a16="http://schemas.microsoft.com/office/drawing/2014/main" xmlns="" id="{5EE6861F-9A2A-488E-AE1F-ED2346D1384F}"/>
               </a:ext>
             </a:extLst>
           </p:cNvPr>
@@ -4902,7 +5785,15 @@
           <a:p>
             <a:r>
               <a:rPr lang="en-AU" dirty="0"/>
-              <a:t>Role = Actor: It is the heart of the screenplay pattern</a:t>
+              <a:t>Role = </a:t>
+            </a:r>
+            <a:r>
+              <a:rPr lang="en-AU" dirty="0" smtClean="0"/>
+              <a:t>Actor = Persona: </a:t>
+            </a:r>
+            <a:r>
+              <a:rPr lang="en-AU" dirty="0"/>
+              <a:t>It is the heart of the screenplay pattern</a:t>
             </a:r>
           </a:p>
           <a:p>
@@ -4946,7 +5837,7 @@
           <p:cNvPr id="20" name="Picture 19">
             <a:extLst>
               <a:ext uri="{FF2B5EF4-FFF2-40B4-BE49-F238E27FC236}">
-                <a16:creationId xmlns:a16="http://schemas.microsoft.com/office/drawing/2014/main" id="{C40C69F6-D915-451B-A064-81A4AD15D0A6}"/>
+                <a16:creationId xmlns:a16="http://schemas.microsoft.com/office/drawing/2014/main" xmlns="" id="{C40C69F6-D915-451B-A064-81A4AD15D0A6}"/>
               </a:ext>
             </a:extLst>
           </p:cNvPr>
@@ -4976,7 +5867,7 @@
           <p:cNvPr id="25" name="Picture 24">
             <a:extLst>
               <a:ext uri="{FF2B5EF4-FFF2-40B4-BE49-F238E27FC236}">
-                <a16:creationId xmlns:a16="http://schemas.microsoft.com/office/drawing/2014/main" id="{C98D80B9-B2D1-4EE6-8EC2-9E7D9318CE51}"/>
+                <a16:creationId xmlns:a16="http://schemas.microsoft.com/office/drawing/2014/main" xmlns="" id="{C98D80B9-B2D1-4EE6-8EC2-9E7D9318CE51}"/>
               </a:ext>
             </a:extLst>
           </p:cNvPr>
@@ -5011,6 +5902,13 @@
   <p:clrMapOvr>
     <a:masterClrMapping/>
   </p:clrMapOvr>
+  <p:timing>
+    <p:tnLst>
+      <p:par>
+        <p:cTn id="1" dur="indefinite" restart="never" nodeType="tmRoot"/>
+      </p:par>
+    </p:tnLst>
+  </p:timing>
 </p:sld>
 </file>
 
@@ -5070,7 +5968,7 @@
           <p:cNvPr id="19" name="Content Placeholder 18">
             <a:extLst>
               <a:ext uri="{FF2B5EF4-FFF2-40B4-BE49-F238E27FC236}">
-                <a16:creationId xmlns:a16="http://schemas.microsoft.com/office/drawing/2014/main" id="{5EE6861F-9A2A-488E-AE1F-ED2346D1384F}"/>
+                <a16:creationId xmlns:a16="http://schemas.microsoft.com/office/drawing/2014/main" xmlns="" id="{5EE6861F-9A2A-488E-AE1F-ED2346D1384F}"/>
               </a:ext>
             </a:extLst>
           </p:cNvPr>
@@ -5136,7 +6034,7 @@
           <p:cNvPr id="7" name="Picture 6">
             <a:extLst>
               <a:ext uri="{FF2B5EF4-FFF2-40B4-BE49-F238E27FC236}">
-                <a16:creationId xmlns:a16="http://schemas.microsoft.com/office/drawing/2014/main" id="{211E1EB5-7DEB-45FD-8315-AF4D96CF07CE}"/>
+                <a16:creationId xmlns:a16="http://schemas.microsoft.com/office/drawing/2014/main" xmlns="" id="{211E1EB5-7DEB-45FD-8315-AF4D96CF07CE}"/>
               </a:ext>
             </a:extLst>
           </p:cNvPr>
@@ -5166,7 +6064,7 @@
           <p:cNvPr id="10244" name="Picture 4" descr="journey command pattern">
             <a:extLst>
               <a:ext uri="{FF2B5EF4-FFF2-40B4-BE49-F238E27FC236}">
-                <a16:creationId xmlns:a16="http://schemas.microsoft.com/office/drawing/2014/main" id="{8086C2C2-5908-40C8-94D0-BB6DF87F1CDF}"/>
+                <a16:creationId xmlns:a16="http://schemas.microsoft.com/office/drawing/2014/main" xmlns="" id="{8086C2C2-5908-40C8-94D0-BB6DF87F1CDF}"/>
               </a:ext>
             </a:extLst>
           </p:cNvPr>
@@ -5213,7 +6111,7 @@
           <p:cNvPr id="12" name="Content Placeholder 18">
             <a:extLst>
               <a:ext uri="{FF2B5EF4-FFF2-40B4-BE49-F238E27FC236}">
-                <a16:creationId xmlns:a16="http://schemas.microsoft.com/office/drawing/2014/main" id="{131D279D-00F0-4FAB-81E4-5F6AE021EFBC}"/>
+                <a16:creationId xmlns:a16="http://schemas.microsoft.com/office/drawing/2014/main" xmlns="" id="{131D279D-00F0-4FAB-81E4-5F6AE021EFBC}"/>
               </a:ext>
             </a:extLst>
           </p:cNvPr>
@@ -5408,6 +6306,46 @@
           <a:p>
             <a:pPr lvl="1"/>
             <a:endParaRPr lang="en-AU" dirty="0"/>
+          </a:p>
+        </p:txBody>
+      </p:sp>
+      <p:sp>
+        <p:nvSpPr>
+          <p:cNvPr id="8" name="TextBox 7"/>
+          <p:cNvSpPr txBox="1"/>
+          <p:nvPr/>
+        </p:nvSpPr>
+        <p:spPr>
+          <a:xfrm>
+            <a:off x="1965554" y="5958750"/>
+            <a:ext cx="4905014" cy="369332"/>
+          </a:xfrm>
+          <a:prstGeom prst="rect">
+            <a:avLst/>
+          </a:prstGeom>
+          <a:noFill/>
+        </p:spPr>
+        <p:txBody>
+          <a:bodyPr wrap="square" rtlCol="0">
+            <a:spAutoFit/>
+          </a:bodyPr>
+          <a:lstStyle/>
+          <a:p>
+            <a:pPr marL="0" lvl="1"/>
+            <a:r>
+              <a:rPr lang="en-US" sz="900" dirty="0" smtClean="0"/>
+              <a:t>Images taken from: </a:t>
+            </a:r>
+            <a:r>
+              <a:rPr lang="en-AU" sz="900" dirty="0">
+                <a:hlinkClick r:id="rId4"/>
+              </a:rPr>
+              <a:t>https://dzone.com/articles/page-objects-refactored-solid-steps-to-the-screenp</a:t>
+            </a:r>
+            <a:endParaRPr lang="en-AU" sz="900" dirty="0"/>
+          </a:p>
+          <a:p>
+            <a:endParaRPr lang="en-US" sz="900" dirty="0"/>
           </a:p>
         </p:txBody>
       </p:sp>
@@ -5421,6 +6359,13 @@
   <p:clrMapOvr>
     <a:masterClrMapping/>
   </p:clrMapOvr>
+  <p:timing>
+    <p:tnLst>
+      <p:par>
+        <p:cTn id="1" dur="indefinite" restart="never" nodeType="tmRoot"/>
+      </p:par>
+    </p:tnLst>
+  </p:timing>
 </p:sld>
 </file>
 
@@ -5480,7 +6425,7 @@
           <p:cNvPr id="19" name="Content Placeholder 18">
             <a:extLst>
               <a:ext uri="{FF2B5EF4-FFF2-40B4-BE49-F238E27FC236}">
-                <a16:creationId xmlns:a16="http://schemas.microsoft.com/office/drawing/2014/main" id="{5EE6861F-9A2A-488E-AE1F-ED2346D1384F}"/>
+                <a16:creationId xmlns:a16="http://schemas.microsoft.com/office/drawing/2014/main" xmlns="" id="{5EE6861F-9A2A-488E-AE1F-ED2346D1384F}"/>
               </a:ext>
             </a:extLst>
           </p:cNvPr>
@@ -5518,7 +6463,7 @@
           <p:cNvPr id="12" name="Content Placeholder 18">
             <a:extLst>
               <a:ext uri="{FF2B5EF4-FFF2-40B4-BE49-F238E27FC236}">
-                <a16:creationId xmlns:a16="http://schemas.microsoft.com/office/drawing/2014/main" id="{131D279D-00F0-4FAB-81E4-5F6AE021EFBC}"/>
+                <a16:creationId xmlns:a16="http://schemas.microsoft.com/office/drawing/2014/main" xmlns="" id="{131D279D-00F0-4FAB-81E4-5F6AE021EFBC}"/>
               </a:ext>
             </a:extLst>
           </p:cNvPr>
@@ -5717,7 +6662,7 @@
           <p:cNvPr id="4" name="Picture 3">
             <a:extLst>
               <a:ext uri="{FF2B5EF4-FFF2-40B4-BE49-F238E27FC236}">
-                <a16:creationId xmlns:a16="http://schemas.microsoft.com/office/drawing/2014/main" id="{F809A320-4B91-4C69-88FA-1727F1262DFF}"/>
+                <a16:creationId xmlns:a16="http://schemas.microsoft.com/office/drawing/2014/main" xmlns="" id="{F809A320-4B91-4C69-88FA-1727F1262DFF}"/>
               </a:ext>
             </a:extLst>
           </p:cNvPr>
@@ -5747,7 +6692,7 @@
           <p:cNvPr id="5" name="Picture 4">
             <a:extLst>
               <a:ext uri="{FF2B5EF4-FFF2-40B4-BE49-F238E27FC236}">
-                <a16:creationId xmlns:a16="http://schemas.microsoft.com/office/drawing/2014/main" id="{B0207075-13DC-4B88-BD72-D24BD5769DDA}"/>
+                <a16:creationId xmlns:a16="http://schemas.microsoft.com/office/drawing/2014/main" xmlns="" id="{B0207075-13DC-4B88-BD72-D24BD5769DDA}"/>
               </a:ext>
             </a:extLst>
           </p:cNvPr>
@@ -5782,6 +6727,13 @@
   <p:clrMapOvr>
     <a:masterClrMapping/>
   </p:clrMapOvr>
+  <p:timing>
+    <p:tnLst>
+      <p:par>
+        <p:cTn id="1" dur="indefinite" restart="never" nodeType="tmRoot"/>
+      </p:par>
+    </p:tnLst>
+  </p:timing>
 </p:sld>
 </file>
 
@@ -5841,7 +6793,7 @@
           <p:cNvPr id="7" name="Picture 6">
             <a:extLst>
               <a:ext uri="{FF2B5EF4-FFF2-40B4-BE49-F238E27FC236}">
-                <a16:creationId xmlns:a16="http://schemas.microsoft.com/office/drawing/2014/main" id="{3F2E570B-B57A-4C2A-9A2A-CFCED41B4AFA}"/>
+                <a16:creationId xmlns:a16="http://schemas.microsoft.com/office/drawing/2014/main" xmlns="" id="{3F2E570B-B57A-4C2A-9A2A-CFCED41B4AFA}"/>
               </a:ext>
             </a:extLst>
           </p:cNvPr>
@@ -5871,7 +6823,7 @@
           <p:cNvPr id="8" name="Picture 7">
             <a:extLst>
               <a:ext uri="{FF2B5EF4-FFF2-40B4-BE49-F238E27FC236}">
-                <a16:creationId xmlns:a16="http://schemas.microsoft.com/office/drawing/2014/main" id="{C4F13BD1-7C6F-4979-BEA8-A5391ABB7CEE}"/>
+                <a16:creationId xmlns:a16="http://schemas.microsoft.com/office/drawing/2014/main" xmlns="" id="{C4F13BD1-7C6F-4979-BEA8-A5391ABB7CEE}"/>
               </a:ext>
             </a:extLst>
           </p:cNvPr>
@@ -5901,7 +6853,7 @@
           <p:cNvPr id="9" name="Picture 8">
             <a:extLst>
               <a:ext uri="{FF2B5EF4-FFF2-40B4-BE49-F238E27FC236}">
-                <a16:creationId xmlns:a16="http://schemas.microsoft.com/office/drawing/2014/main" id="{FBE1068C-3CA6-491C-9E55-F9386755946B}"/>
+                <a16:creationId xmlns:a16="http://schemas.microsoft.com/office/drawing/2014/main" xmlns="" id="{FBE1068C-3CA6-491C-9E55-F9386755946B}"/>
               </a:ext>
             </a:extLst>
           </p:cNvPr>
@@ -5936,6 +6888,13 @@
   <p:clrMapOvr>
     <a:masterClrMapping/>
   </p:clrMapOvr>
+  <p:timing>
+    <p:tnLst>
+      <p:par>
+        <p:cTn id="1" dur="indefinite" restart="never" nodeType="tmRoot"/>
+      </p:par>
+    </p:tnLst>
+  </p:timing>
 </p:sld>
 </file>
 
@@ -5995,7 +6954,7 @@
           <p:cNvPr id="4" name="Picture 3">
             <a:extLst>
               <a:ext uri="{FF2B5EF4-FFF2-40B4-BE49-F238E27FC236}">
-                <a16:creationId xmlns:a16="http://schemas.microsoft.com/office/drawing/2014/main" id="{D034E597-4F98-48F1-86AA-F140EF2C2362}"/>
+                <a16:creationId xmlns:a16="http://schemas.microsoft.com/office/drawing/2014/main" xmlns="" id="{D034E597-4F98-48F1-86AA-F140EF2C2362}"/>
               </a:ext>
             </a:extLst>
           </p:cNvPr>
@@ -6025,7 +6984,7 @@
           <p:cNvPr id="10" name="Content Placeholder 18">
             <a:extLst>
               <a:ext uri="{FF2B5EF4-FFF2-40B4-BE49-F238E27FC236}">
-                <a16:creationId xmlns:a16="http://schemas.microsoft.com/office/drawing/2014/main" id="{FE555A64-A3C0-4008-80B1-4FC487DC8626}"/>
+                <a16:creationId xmlns:a16="http://schemas.microsoft.com/office/drawing/2014/main" xmlns="" id="{FE555A64-A3C0-4008-80B1-4FC487DC8626}"/>
               </a:ext>
             </a:extLst>
           </p:cNvPr>
@@ -6238,7 +7197,11 @@
             <a:pPr lvl="1"/>
             <a:r>
               <a:rPr lang="en-AU" dirty="0"/>
-              <a:t>Verify result</a:t>
+              <a:t>Verify </a:t>
+            </a:r>
+            <a:r>
+              <a:rPr lang="en-AU" dirty="0" smtClean="0"/>
+              <a:t>result</a:t>
             </a:r>
           </a:p>
         </p:txBody>
@@ -6248,7 +7211,7 @@
           <p:cNvPr id="5" name="Picture 4">
             <a:extLst>
               <a:ext uri="{FF2B5EF4-FFF2-40B4-BE49-F238E27FC236}">
-                <a16:creationId xmlns:a16="http://schemas.microsoft.com/office/drawing/2014/main" id="{CABE5780-091C-4AA4-ACFB-AEF7900F86CF}"/>
+                <a16:creationId xmlns:a16="http://schemas.microsoft.com/office/drawing/2014/main" xmlns="" id="{CABE5780-091C-4AA4-ACFB-AEF7900F86CF}"/>
               </a:ext>
             </a:extLst>
           </p:cNvPr>
@@ -6273,6 +7236,46 @@
           </a:prstGeom>
         </p:spPr>
       </p:pic>
+      <p:sp>
+        <p:nvSpPr>
+          <p:cNvPr id="6" name="TextBox 5"/>
+          <p:cNvSpPr txBox="1"/>
+          <p:nvPr/>
+        </p:nvSpPr>
+        <p:spPr>
+          <a:xfrm>
+            <a:off x="838198" y="6257767"/>
+            <a:ext cx="4905014" cy="369332"/>
+          </a:xfrm>
+          <a:prstGeom prst="rect">
+            <a:avLst/>
+          </a:prstGeom>
+          <a:noFill/>
+        </p:spPr>
+        <p:txBody>
+          <a:bodyPr wrap="square" rtlCol="0">
+            <a:spAutoFit/>
+          </a:bodyPr>
+          <a:lstStyle/>
+          <a:p>
+            <a:pPr marL="0" lvl="1"/>
+            <a:r>
+              <a:rPr lang="en-US" sz="900" dirty="0" smtClean="0"/>
+              <a:t>Images taken from: </a:t>
+            </a:r>
+            <a:r>
+              <a:rPr lang="en-AU" sz="900" dirty="0">
+                <a:hlinkClick r:id="rId4"/>
+              </a:rPr>
+              <a:t>https://dzone.com/articles/page-objects-refactored-solid-steps-to-the-screenp</a:t>
+            </a:r>
+            <a:endParaRPr lang="en-AU" sz="900" dirty="0"/>
+          </a:p>
+          <a:p>
+            <a:endParaRPr lang="en-US" sz="900" dirty="0"/>
+          </a:p>
+        </p:txBody>
+      </p:sp>
     </p:spTree>
     <p:extLst>
       <p:ext uri="{BB962C8B-B14F-4D97-AF65-F5344CB8AC3E}">
@@ -6283,6 +7286,13 @@
   <p:clrMapOvr>
     <a:masterClrMapping/>
   </p:clrMapOvr>
+  <p:timing>
+    <p:tnLst>
+      <p:par>
+        <p:cTn id="1" dur="indefinite" restart="never" nodeType="tmRoot"/>
+      </p:par>
+    </p:tnLst>
+  </p:timing>
 </p:sld>
 </file>
 
@@ -6414,6 +7424,13 @@
   <p:clrMapOvr>
     <a:masterClrMapping/>
   </p:clrMapOvr>
+  <p:timing>
+    <p:tnLst>
+      <p:par>
+        <p:cTn id="1" dur="indefinite" restart="never" nodeType="tmRoot"/>
+      </p:par>
+    </p:tnLst>
+  </p:timing>
 </p:sld>
 </file>
 
@@ -6473,7 +7490,7 @@
           <p:cNvPr id="7" name="Content Placeholder 6">
             <a:extLst>
               <a:ext uri="{FF2B5EF4-FFF2-40B4-BE49-F238E27FC236}">
-                <a16:creationId xmlns:a16="http://schemas.microsoft.com/office/drawing/2014/main" id="{ADD55980-664F-4673-A1E6-775C47ADA2AF}"/>
+                <a16:creationId xmlns:a16="http://schemas.microsoft.com/office/drawing/2014/main" xmlns="" id="{ADD55980-664F-4673-A1E6-775C47ADA2AF}"/>
               </a:ext>
             </a:extLst>
           </p:cNvPr>
@@ -6637,7 +7654,7 @@
           <p:cNvPr id="9" name="Content Placeholder 6">
             <a:extLst>
               <a:ext uri="{FF2B5EF4-FFF2-40B4-BE49-F238E27FC236}">
-                <a16:creationId xmlns:a16="http://schemas.microsoft.com/office/drawing/2014/main" id="{F811AE74-8DB6-4DBD-89F9-BA3E897174BB}"/>
+                <a16:creationId xmlns:a16="http://schemas.microsoft.com/office/drawing/2014/main" xmlns="" id="{F811AE74-8DB6-4DBD-89F9-BA3E897174BB}"/>
               </a:ext>
             </a:extLst>
           </p:cNvPr>
@@ -6887,6 +7904,13 @@
   <p:clrMapOvr>
     <a:masterClrMapping/>
   </p:clrMapOvr>
+  <p:timing>
+    <p:tnLst>
+      <p:par>
+        <p:cTn id="1" dur="indefinite" restart="never" nodeType="tmRoot"/>
+      </p:par>
+    </p:tnLst>
+  </p:timing>
 </p:sld>
 </file>
 
@@ -6935,11 +7959,7 @@
           <a:p>
             <a:r>
               <a:rPr lang="en-AU" dirty="0"/>
-              <a:t>Show working demo - </a:t>
-            </a:r>
-            <a:r>
-              <a:rPr lang="en-AU" dirty="0" err="1"/>
-              <a:t>ToDoMVC</a:t>
+              <a:t>Show working demo - ToDoMVC</a:t>
             </a:r>
             <a:endParaRPr lang="en-US" dirty="0"/>
           </a:p>
@@ -6950,7 +7970,7 @@
           <p:cNvPr id="4" name="Content Placeholder 3">
             <a:extLst>
               <a:ext uri="{FF2B5EF4-FFF2-40B4-BE49-F238E27FC236}">
-                <a16:creationId xmlns:a16="http://schemas.microsoft.com/office/drawing/2014/main" id="{E6FA446D-0399-4B61-9924-745EF166B8FA}"/>
+                <a16:creationId xmlns:a16="http://schemas.microsoft.com/office/drawing/2014/main" xmlns="" id="{E6FA446D-0399-4B61-9924-745EF166B8FA}"/>
               </a:ext>
             </a:extLst>
           </p:cNvPr>
@@ -6967,12 +7987,8 @@
           <a:lstStyle/>
           <a:p>
             <a:r>
-              <a:rPr lang="en-AU" dirty="0" err="1"/>
-              <a:t>ToDoMVC</a:t>
-            </a:r>
-            <a:r>
-              <a:rPr lang="en-AU" dirty="0"/>
-              <a:t> URL: </a:t>
+              <a:rPr lang="en-AU" dirty="0"/>
+              <a:t>ToDoMVC URL: </a:t>
             </a:r>
             <a:r>
               <a:rPr lang="en-AU" dirty="0">
@@ -7016,7 +8032,7 @@
           <p:cNvPr id="14339" name="Picture 3" descr="serenity logo">
             <a:extLst>
               <a:ext uri="{FF2B5EF4-FFF2-40B4-BE49-F238E27FC236}">
-                <a16:creationId xmlns:a16="http://schemas.microsoft.com/office/drawing/2014/main" id="{4172C009-901B-4529-9DA4-F710D53EDE26}"/>
+                <a16:creationId xmlns:a16="http://schemas.microsoft.com/office/drawing/2014/main" xmlns="" id="{4172C009-901B-4529-9DA4-F710D53EDE26}"/>
               </a:ext>
             </a:extLst>
           </p:cNvPr>
@@ -7068,6 +8084,13 @@
   <p:clrMapOvr>
     <a:masterClrMapping/>
   </p:clrMapOvr>
+  <p:timing>
+    <p:tnLst>
+      <p:par>
+        <p:cTn id="1" dur="indefinite" restart="never" nodeType="tmRoot"/>
+      </p:par>
+    </p:tnLst>
+  </p:timing>
 </p:sld>
 </file>
 
@@ -7173,6 +8196,13 @@
   <p:clrMapOvr>
     <a:masterClrMapping/>
   </p:clrMapOvr>
+  <p:timing>
+    <p:tnLst>
+      <p:par>
+        <p:cTn id="1" dur="indefinite" restart="never" nodeType="tmRoot"/>
+      </p:par>
+    </p:tnLst>
+  </p:timing>
 </p:sld>
 </file>
 
@@ -7245,7 +8275,7 @@
         </p:spPr>
         <p:txBody>
           <a:bodyPr>
-            <a:normAutofit fontScale="92500" lnSpcReduction="10000"/>
+            <a:normAutofit fontScale="92500" lnSpcReduction="20000"/>
           </a:bodyPr>
           <a:lstStyle/>
           <a:p>
@@ -7319,9 +8349,31 @@
               <a:rPr lang="en-AU" dirty="0">
                 <a:hlinkClick r:id="rId5"/>
               </a:rPr>
-              <a:t>https://dzone.com/articles/page-objects-refactored-solid-steps-to-the-screenp</a:t>
-            </a:r>
-            <a:endParaRPr lang="en-AU" dirty="0"/>
+              <a:t>https://</a:t>
+            </a:r>
+            <a:r>
+              <a:rPr lang="en-AU" dirty="0" smtClean="0">
+                <a:hlinkClick r:id="rId5"/>
+              </a:rPr>
+              <a:t>dzone.com/articles/page-objects-refactored-solid-steps-to-the-screenp</a:t>
+            </a:r>
+            <a:endParaRPr lang="en-AU" dirty="0" smtClean="0"/>
+          </a:p>
+          <a:p>
+            <a:pPr lvl="1"/>
+            <a:r>
+              <a:rPr lang="en-AU" dirty="0">
+                <a:hlinkClick r:id="rId6"/>
+              </a:rPr>
+              <a:t>http://testerstories.com/2016/06/screenplays-and-journeys-not-page-objects</a:t>
+            </a:r>
+            <a:r>
+              <a:rPr lang="en-AU" dirty="0" smtClean="0">
+                <a:hlinkClick r:id="rId6"/>
+              </a:rPr>
+              <a:t>/</a:t>
+            </a:r>
+            <a:endParaRPr lang="en-AU" dirty="0" smtClean="0"/>
           </a:p>
         </p:txBody>
       </p:sp>
@@ -7335,6 +8387,13 @@
   <p:clrMapOvr>
     <a:masterClrMapping/>
   </p:clrMapOvr>
+  <p:timing>
+    <p:tnLst>
+      <p:par>
+        <p:cTn id="1" dur="indefinite" restart="never" nodeType="tmRoot"/>
+      </p:par>
+    </p:tnLst>
+  </p:timing>
 </p:sld>
 </file>
 
@@ -7382,8 +8441,8 @@
           <a:lstStyle/>
           <a:p>
             <a:r>
-              <a:rPr lang="en-AU" dirty="0"/>
-              <a:t>Serenity-BDD</a:t>
+              <a:rPr lang="en-AU" dirty="0" smtClean="0"/>
+              <a:t>Serenity-BDD/JS</a:t>
             </a:r>
             <a:endParaRPr lang="en-US" dirty="0"/>
           </a:p>
@@ -7424,14 +8483,24 @@
           <a:p>
             <a:r>
               <a:rPr lang="en-AU" dirty="0"/>
-              <a:t>Integrates with BDD/Unit test frameworks </a:t>
-            </a:r>
-          </a:p>
-          <a:p>
-            <a:r>
-              <a:rPr lang="en-AU" dirty="0"/>
-              <a:t>Supports the page object design pattern and the screenplay design pattern</a:t>
-            </a:r>
+              <a:t>Integrates </a:t>
+            </a:r>
+            <a:r>
+              <a:rPr lang="en-AU" dirty="0" smtClean="0"/>
+              <a:t>with existing test frameworks</a:t>
+            </a:r>
+            <a:endParaRPr lang="en-AU" dirty="0"/>
+          </a:p>
+          <a:p>
+            <a:r>
+              <a:rPr lang="en-AU" dirty="0"/>
+              <a:t>Supports the </a:t>
+            </a:r>
+            <a:r>
+              <a:rPr lang="en-AU" dirty="0" smtClean="0"/>
+              <a:t>page object &amp; screenplay design pattern</a:t>
+            </a:r>
+            <a:endParaRPr lang="en-AU" dirty="0"/>
           </a:p>
         </p:txBody>
       </p:sp>
@@ -7445,6 +8514,13 @@
   <p:clrMapOvr>
     <a:masterClrMapping/>
   </p:clrMapOvr>
+  <p:timing>
+    <p:tnLst>
+      <p:par>
+        <p:cTn id="1" dur="indefinite" restart="never" nodeType="tmRoot"/>
+      </p:par>
+    </p:tnLst>
+  </p:timing>
 </p:sld>
 </file>
 
@@ -7488,7 +8564,7 @@
         </p:nvSpPr>
         <p:spPr>
           <a:xfrm>
-            <a:off x="134931" y="92278"/>
+            <a:off x="729833" y="43466"/>
             <a:ext cx="10515600" cy="1325563"/>
           </a:xfrm>
         </p:spPr>
@@ -7520,8 +8596,8 @@
         </p:blipFill>
         <p:spPr>
           <a:xfrm>
-            <a:off x="5452844" y="864714"/>
-            <a:ext cx="6321328" cy="5594275"/>
+            <a:off x="5642516" y="1369029"/>
+            <a:ext cx="5819421" cy="5089960"/>
           </a:xfrm>
           <a:prstGeom prst="rect">
             <a:avLst/>
@@ -7544,7 +8620,7 @@
         </p:blipFill>
         <p:spPr>
           <a:xfrm>
-            <a:off x="294323" y="4817392"/>
+            <a:off x="729833" y="4817392"/>
             <a:ext cx="4630015" cy="1641597"/>
           </a:xfrm>
           <a:prstGeom prst="rect">
@@ -7568,7 +8644,7 @@
         </p:blipFill>
         <p:spPr>
           <a:xfrm>
-            <a:off x="294322" y="1320217"/>
+            <a:off x="729833" y="1369029"/>
             <a:ext cx="4630015" cy="3497175"/>
           </a:xfrm>
           <a:prstGeom prst="rect">
@@ -7586,6 +8662,13 @@
   <p:clrMapOvr>
     <a:masterClrMapping/>
   </p:clrMapOvr>
+  <p:timing>
+    <p:tnLst>
+      <p:par>
+        <p:cTn id="1" dur="indefinite" restart="never" nodeType="tmRoot"/>
+      </p:par>
+    </p:tnLst>
+  </p:timing>
 </p:sld>
 </file>
 
@@ -7702,6 +8785,13 @@
   <p:clrMapOvr>
     <a:masterClrMapping/>
   </p:clrMapOvr>
+  <p:timing>
+    <p:tnLst>
+      <p:par>
+        <p:cTn id="1" dur="indefinite" restart="never" nodeType="tmRoot"/>
+      </p:par>
+    </p:tnLst>
+  </p:timing>
 </p:sld>
 </file>
 
@@ -7750,7 +8840,7 @@
           <a:p>
             <a:r>
               <a:rPr lang="en-AU" dirty="0"/>
-              <a:t>History of Journey/Screenplay pattern</a:t>
+              <a:t>Page objects</a:t>
             </a:r>
             <a:endParaRPr lang="en-US" dirty="0"/>
           </a:p>
@@ -7773,44 +8863,120 @@
           </a:xfrm>
         </p:spPr>
         <p:txBody>
-          <a:bodyPr/>
+          <a:bodyPr>
+            <a:normAutofit fontScale="85000" lnSpcReduction="20000"/>
+          </a:bodyPr>
           <a:lstStyle/>
           <a:p>
             <a:r>
               <a:rPr lang="en-AU" dirty="0"/>
-              <a:t>Agile alliance functional testing tools workshop (AAFTT) 2007</a:t>
-            </a:r>
-          </a:p>
-          <a:p>
-            <a:r>
-              <a:rPr lang="en-AU" dirty="0"/>
-              <a:t>2012-13 screenplay-JVM created</a:t>
-            </a:r>
-          </a:p>
-          <a:p>
-            <a:r>
-              <a:rPr lang="en-AU" dirty="0"/>
-              <a:t>2015 screenplay pattern implemented into Serenity-BDD</a:t>
-            </a:r>
-          </a:p>
-          <a:p>
-            <a:r>
-              <a:rPr lang="en-AU" dirty="0"/>
-              <a:t>2016 implemented into Serenity-JS</a:t>
-            </a:r>
+              <a:t>Page objects staple of automated web test frameworks using Selenium </a:t>
+            </a:r>
+            <a:r>
+              <a:rPr lang="mr-IN" dirty="0" smtClean="0"/>
+              <a:t>–</a:t>
+            </a:r>
+            <a:r>
+              <a:rPr lang="en-AU" dirty="0" smtClean="0"/>
+              <a:t> from the WebDriver project.</a:t>
+            </a:r>
+            <a:endParaRPr lang="en-AU" dirty="0"/>
+          </a:p>
+          <a:p>
+            <a:r>
+              <a:rPr lang="en-AU" dirty="0"/>
+              <a:t>Reduce maintenance issues and flaky tests (Not Selenium’s fault)</a:t>
+            </a:r>
+          </a:p>
+          <a:p>
+            <a:endParaRPr lang="en-AU" dirty="0"/>
+          </a:p>
+          <a:p>
+            <a:r>
+              <a:rPr lang="en-AU" dirty="0"/>
+              <a:t>Simon Stewart talked of this in his article “My Selenium Tests aren’t </a:t>
+            </a:r>
+            <a:r>
+              <a:rPr lang="en-AU" dirty="0" err="1"/>
+              <a:t>Stable”when</a:t>
+            </a:r>
+            <a:r>
+              <a:rPr lang="en-AU" dirty="0"/>
+              <a:t> he said:</a:t>
+            </a:r>
+          </a:p>
+          <a:p>
+            <a:pPr lvl="1"/>
+            <a:r>
+              <a:rPr lang="en-AU" i="1" dirty="0"/>
+              <a:t>“Firstly, let’s state clearly: Selenium is not unstable, and your Selenium tests don’t need to be flaky. The same applies for your WebDriver tests. […] When your tests are flaky, do some root cause analysis to understand why they’re flaky. It’s very seldom because you’ve uncovered a bug in the test framework</a:t>
+            </a:r>
+            <a:r>
+              <a:rPr lang="en-AU" i="1" dirty="0" smtClean="0"/>
+              <a:t>.”</a:t>
+            </a:r>
+          </a:p>
+          <a:p>
+            <a:pPr lvl="1"/>
+            <a:endParaRPr lang="en-AU" i="1" dirty="0" smtClean="0"/>
+          </a:p>
+          <a:p>
+            <a:r>
+              <a:rPr lang="en-AU" dirty="0" smtClean="0"/>
+              <a:t>WD </a:t>
+            </a:r>
+            <a:r>
+              <a:rPr lang="en-AU" dirty="0"/>
+              <a:t>enshrined PO’s, PO’s are not the best domain model to </a:t>
+            </a:r>
+            <a:r>
+              <a:rPr lang="en-AU" dirty="0" smtClean="0"/>
+              <a:t>apply </a:t>
+            </a:r>
+            <a:r>
+              <a:rPr lang="mr-IN" dirty="0" smtClean="0"/>
+              <a:t>–</a:t>
+            </a:r>
+            <a:r>
+              <a:rPr lang="en-AU" dirty="0" smtClean="0"/>
+              <a:t> why not investigate more design patterns? PO’s fine?</a:t>
+            </a:r>
+            <a:endParaRPr lang="en-AU" dirty="0"/>
+          </a:p>
+          <a:p>
+            <a:pPr marL="0" indent="0">
+              <a:buNone/>
+            </a:pPr>
+            <a:endParaRPr lang="en-AU" dirty="0"/>
+          </a:p>
+          <a:p>
+            <a:endParaRPr lang="en-AU" dirty="0"/>
+          </a:p>
+          <a:p>
+            <a:pPr marL="457200" lvl="1" indent="0">
+              <a:buNone/>
+            </a:pPr>
+            <a:endParaRPr lang="en-AU" dirty="0"/>
           </a:p>
         </p:txBody>
       </p:sp>
     </p:spTree>
     <p:extLst>
       <p:ext uri="{BB962C8B-B14F-4D97-AF65-F5344CB8AC3E}">
-        <p14:creationId xmlns:p14="http://schemas.microsoft.com/office/powerpoint/2010/main" val="1885412249"/>
+        <p14:creationId xmlns:p14="http://schemas.microsoft.com/office/powerpoint/2010/main" val="6017667"/>
       </p:ext>
     </p:extLst>
   </p:cSld>
   <p:clrMapOvr>
     <a:masterClrMapping/>
   </p:clrMapOvr>
+  <p:timing>
+    <p:tnLst>
+      <p:par>
+        <p:cTn id="1" dur="indefinite" restart="never" nodeType="tmRoot"/>
+      </p:par>
+    </p:tnLst>
+  </p:timing>
 </p:sld>
 </file>
 
@@ -7859,7 +9025,11 @@
           <a:p>
             <a:r>
               <a:rPr lang="en-AU" dirty="0"/>
-              <a:t>Page objects</a:t>
+              <a:t>Page </a:t>
+            </a:r>
+            <a:r>
+              <a:rPr lang="en-AU" dirty="0" smtClean="0"/>
+              <a:t>objects</a:t>
             </a:r>
             <a:endParaRPr lang="en-US" dirty="0"/>
           </a:p>
@@ -7883,72 +9053,75 @@
         </p:spPr>
         <p:txBody>
           <a:bodyPr>
-            <a:normAutofit lnSpcReduction="10000"/>
+            <a:normAutofit fontScale="92500" lnSpcReduction="10000"/>
           </a:bodyPr>
           <a:lstStyle/>
           <a:p>
             <a:r>
               <a:rPr lang="en-AU" dirty="0"/>
-              <a:t>Page objects staple of automated web test frameworks using Selenium </a:t>
-            </a:r>
-          </a:p>
-          <a:p>
-            <a:r>
-              <a:rPr lang="en-AU" dirty="0"/>
-              <a:t>Reduce maintenance issues and flaky tests (Not Selenium’s fault)</a:t>
-            </a:r>
-          </a:p>
-          <a:p>
+              <a:t>Example of complex page object:</a:t>
+            </a:r>
+          </a:p>
+          <a:p>
+            <a:pPr lvl="1"/>
+            <a:r>
+              <a:rPr lang="en-AU" dirty="0">
+                <a:hlinkClick r:id="rId2"/>
+              </a:rPr>
+              <a:t>https://gist.github.com/RiverGlide/7718ab70f9d1ee0eddbf8bcf95887555</a:t>
+            </a:r>
             <a:endParaRPr lang="en-AU" dirty="0"/>
           </a:p>
           <a:p>
-            <a:r>
-              <a:rPr lang="en-AU" dirty="0"/>
-              <a:t>Simon Stewart talked of this in his article “My Selenium Tests aren’t </a:t>
-            </a:r>
-            <a:r>
-              <a:rPr lang="en-AU" dirty="0" err="1"/>
-              <a:t>Stable”when</a:t>
-            </a:r>
-            <a:r>
-              <a:rPr lang="en-AU" dirty="0"/>
-              <a:t> he said:</a:t>
-            </a:r>
-          </a:p>
-          <a:p>
-            <a:pPr lvl="1"/>
-            <a:r>
-              <a:rPr lang="en-AU" dirty="0"/>
-              <a:t>“Firstly, let’s state clearly: Selenium is not unstable, and your Selenium tests don’t need to be flaky. The same applies for your WebDriver tests. […] When your tests are flaky, do some root cause analysis to understand why they’re flaky. It’s very seldom because you’ve uncovered a bug in the test framework.”</a:t>
-            </a:r>
-          </a:p>
-          <a:p>
-            <a:pPr marL="0" indent="0">
-              <a:buNone/>
-            </a:pPr>
             <a:endParaRPr lang="en-AU" dirty="0"/>
           </a:p>
           <a:p>
+            <a:r>
+              <a:rPr lang="en-AU" dirty="0"/>
+              <a:t>One approach is to not think of each page as an object representing a page – but objects within a page (widget &amp; page component).</a:t>
+            </a:r>
+          </a:p>
+          <a:p>
             <a:endParaRPr lang="en-AU" dirty="0"/>
           </a:p>
           <a:p>
-            <a:pPr marL="457200" lvl="1" indent="0">
-              <a:buNone/>
-            </a:pPr>
+            <a:r>
+              <a:rPr lang="en-AU" dirty="0"/>
+              <a:t>Should not think of what we’re developing in terms of “Pages”, it should be in terms of user stories and what they achieve when implemented</a:t>
+            </a:r>
+            <a:r>
+              <a:rPr lang="en-AU" dirty="0" smtClean="0"/>
+              <a:t>.</a:t>
+            </a:r>
+          </a:p>
+          <a:p>
             <a:endParaRPr lang="en-AU" dirty="0"/>
+          </a:p>
+          <a:p>
+            <a:r>
+              <a:rPr lang="en-AU" dirty="0" smtClean="0"/>
+              <a:t>What if workflow of of pages CHANGE?!</a:t>
+            </a:r>
           </a:p>
         </p:txBody>
       </p:sp>
     </p:spTree>
     <p:extLst>
       <p:ext uri="{BB962C8B-B14F-4D97-AF65-F5344CB8AC3E}">
-        <p14:creationId xmlns:p14="http://schemas.microsoft.com/office/powerpoint/2010/main" val="6017667"/>
+        <p14:creationId xmlns:p14="http://schemas.microsoft.com/office/powerpoint/2010/main" val="2095790375"/>
       </p:ext>
     </p:extLst>
   </p:cSld>
   <p:clrMapOvr>
     <a:masterClrMapping/>
   </p:clrMapOvr>
+  <p:timing>
+    <p:tnLst>
+      <p:par>
+        <p:cTn id="1" dur="indefinite" restart="never" nodeType="tmRoot"/>
+      </p:par>
+    </p:tnLst>
+  </p:timing>
 </p:sld>
 </file>
 
@@ -7997,7 +9170,7 @@
           <a:p>
             <a:r>
               <a:rPr lang="en-AU" dirty="0"/>
-              <a:t>Page objects</a:t>
+              <a:t>History of Journey/Screenplay pattern</a:t>
             </a:r>
             <a:endParaRPr lang="en-US" dirty="0"/>
           </a:p>
@@ -8025,35 +9198,25 @@
           <a:p>
             <a:r>
               <a:rPr lang="en-AU" dirty="0"/>
-              <a:t>Example of complex page object:</a:t>
-            </a:r>
-          </a:p>
-          <a:p>
-            <a:pPr lvl="1"/>
-            <a:r>
-              <a:rPr lang="en-AU" dirty="0">
-                <a:hlinkClick r:id="rId2"/>
-              </a:rPr>
-              <a:t>https://gist.github.com/RiverGlide/7718ab70f9d1ee0eddbf8bcf95887555</a:t>
-            </a:r>
-            <a:endParaRPr lang="en-AU" dirty="0"/>
-          </a:p>
-          <a:p>
-            <a:endParaRPr lang="en-AU" dirty="0"/>
-          </a:p>
-          <a:p>
-            <a:r>
-              <a:rPr lang="en-AU" dirty="0"/>
-              <a:t>One approach is to not think of each page as an object representing a page – but objects within a page (widget &amp; page component).</a:t>
-            </a:r>
-          </a:p>
-          <a:p>
-            <a:endParaRPr lang="en-AU" dirty="0"/>
-          </a:p>
-          <a:p>
-            <a:r>
-              <a:rPr lang="en-AU" dirty="0"/>
-              <a:t>Should not think of what we’re developing in terms of “Pages”, it should be in terms of user stories and what they achieve when implemented.</a:t>
+              <a:t>Agile alliance functional testing tools workshop (AAFTT) 2007</a:t>
+            </a:r>
+          </a:p>
+          <a:p>
+            <a:r>
+              <a:rPr lang="en-AU" dirty="0"/>
+              <a:t>2012-13 screenplay-JVM created</a:t>
+            </a:r>
+          </a:p>
+          <a:p>
+            <a:r>
+              <a:rPr lang="en-AU" dirty="0"/>
+              <a:t>2015 screenplay pattern implemented into Serenity-BDD</a:t>
+            </a:r>
+          </a:p>
+          <a:p>
+            <a:r>
+              <a:rPr lang="en-AU" dirty="0"/>
+              <a:t>2016 implemented into Serenity-JS</a:t>
             </a:r>
           </a:p>
         </p:txBody>
@@ -8061,13 +9224,20 @@
     </p:spTree>
     <p:extLst>
       <p:ext uri="{BB962C8B-B14F-4D97-AF65-F5344CB8AC3E}">
-        <p14:creationId xmlns:p14="http://schemas.microsoft.com/office/powerpoint/2010/main" val="2095790375"/>
+        <p14:creationId xmlns:p14="http://schemas.microsoft.com/office/powerpoint/2010/main" val="1885412249"/>
       </p:ext>
     </p:extLst>
   </p:cSld>
   <p:clrMapOvr>
     <a:masterClrMapping/>
   </p:clrMapOvr>
+  <p:timing>
+    <p:tnLst>
+      <p:par>
+        <p:cTn id="1" dur="indefinite" restart="never" nodeType="tmRoot"/>
+      </p:par>
+    </p:tnLst>
+  </p:timing>
 </p:sld>
 </file>
 
@@ -8109,7 +9279,12 @@
             <p:ph type="title"/>
           </p:nvPr>
         </p:nvSpPr>
-        <p:spPr/>
+        <p:spPr>
+          <a:xfrm>
+            <a:off x="838200" y="376276"/>
+            <a:ext cx="10515600" cy="1325563"/>
+          </a:xfrm>
+        </p:spPr>
         <p:txBody>
           <a:bodyPr/>
           <a:lstStyle/>
@@ -8140,17 +9315,21 @@
         </p:spPr>
         <p:txBody>
           <a:bodyPr>
-            <a:normAutofit fontScale="92500" lnSpcReduction="20000"/>
+            <a:normAutofit fontScale="85000" lnSpcReduction="20000"/>
           </a:bodyPr>
           <a:lstStyle/>
           <a:p>
             <a:r>
-              <a:rPr lang="en-AU" b="1" i="1" u="sng" dirty="0"/>
+              <a:rPr lang="en-AU" b="1" i="1" u="sng" dirty="0" smtClean="0"/>
               <a:t>S</a:t>
             </a:r>
             <a:r>
+              <a:rPr lang="en-AU" u="sng" dirty="0" smtClean="0"/>
+              <a:t>ingle </a:t>
+            </a:r>
+            <a:r>
               <a:rPr lang="en-AU" u="sng" dirty="0"/>
-              <a:t>ingle Responsibility Principle</a:t>
+              <a:t>Responsibility Principle</a:t>
             </a:r>
           </a:p>
           <a:p>
@@ -8223,8 +9402,13 @@
             <a:pPr lvl="1"/>
             <a:r>
               <a:rPr lang="en-AU" dirty="0"/>
-              <a:t>Instead of appending to PO and facing code smells, it should be possible to add a new class that extends on PO. </a:t>
-            </a:r>
+              <a:t>Instead of appending to PO and facing code smells, it should be possible to add a new class that extends on PO</a:t>
+            </a:r>
+            <a:r>
+              <a:rPr lang="en-AU" dirty="0" smtClean="0"/>
+              <a:t>.</a:t>
+            </a:r>
+            <a:endParaRPr lang="en-AU" dirty="0"/>
           </a:p>
           <a:p>
             <a:endParaRPr lang="en-AU" dirty="0"/>
@@ -8241,6 +9425,13 @@
   <p:clrMapOvr>
     <a:masterClrMapping/>
   </p:clrMapOvr>
+  <p:timing>
+    <p:tnLst>
+      <p:par>
+        <p:cTn id="1" dur="indefinite" restart="never" nodeType="tmRoot"/>
+      </p:par>
+    </p:tnLst>
+  </p:timing>
 </p:sld>
 </file>
 

</xml_diff>